<commit_message>
#7 create sign up component
</commit_message>
<xml_diff>
--- a/docs/COMPONENT-DIAGRAM.pptx
+++ b/docs/COMPONENT-DIAGRAM.pptx
@@ -7,6 +7,7 @@
   <p:sldIdLst>
     <p:sldId id="256" r:id="rId2"/>
     <p:sldId id="258" r:id="rId3"/>
+    <p:sldId id="259" r:id="rId4"/>
   </p:sldIdLst>
   <p:sldSz cx="12192000" cy="6858000"/>
   <p:notesSz cx="6858000" cy="9144000"/>
@@ -105,6 +106,11 @@
       </a:defRPr>
     </a:lvl9pPr>
   </p:defaultTextStyle>
+  <p:extLst>
+    <p:ext uri="{EFAFB233-063F-42B5-8137-9DF3F51BA10A}">
+      <p15:sldGuideLst xmlns:p15="http://schemas.microsoft.com/office/powerpoint/2012/main"/>
+    </p:ext>
+  </p:extLst>
 </p:presentation>
 </file>
 
@@ -150,10 +156,9 @@
           </a:lstStyle>
           <a:p>
             <a:r>
-              <a:rPr lang="en-US" smtClean="0"/>
+              <a:rPr lang="en-US"/>
               <a:t>Click to edit Master title style</a:t>
             </a:r>
-            <a:endParaRPr lang="en-US"/>
           </a:p>
         </p:txBody>
       </p:sp>
@@ -215,10 +220,9 @@
           </a:lstStyle>
           <a:p>
             <a:r>
-              <a:rPr lang="en-US" smtClean="0"/>
+              <a:rPr lang="en-US"/>
               <a:t>Click to edit Master subtitle style</a:t>
             </a:r>
-            <a:endParaRPr lang="en-US"/>
           </a:p>
         </p:txBody>
       </p:sp>
@@ -239,7 +243,7 @@
           <a:p>
             <a:fld id="{28BE630F-C39C-4DB9-8258-0B48CA067079}" type="datetimeFigureOut">
               <a:rPr lang="en-US" smtClean="0"/>
-              <a:t>11/25/2021</a:t>
+              <a:t>11/28/2021</a:t>
             </a:fld>
             <a:endParaRPr lang="en-US"/>
           </a:p>
@@ -333,10 +337,9 @@
           <a:lstStyle/>
           <a:p>
             <a:r>
-              <a:rPr lang="en-US" smtClean="0"/>
+              <a:rPr lang="en-US"/>
               <a:t>Click to edit Master title style</a:t>
             </a:r>
-            <a:endParaRPr lang="en-US"/>
           </a:p>
         </p:txBody>
       </p:sp>
@@ -357,38 +360,37 @@
           <a:p>
             <a:pPr lvl="0"/>
             <a:r>
-              <a:rPr lang="en-US" smtClean="0"/>
+              <a:rPr lang="en-US"/>
               <a:t>Click to edit Master text styles</a:t>
             </a:r>
           </a:p>
           <a:p>
             <a:pPr lvl="1"/>
             <a:r>
-              <a:rPr lang="en-US" smtClean="0"/>
+              <a:rPr lang="en-US"/>
               <a:t>Second level</a:t>
             </a:r>
           </a:p>
           <a:p>
             <a:pPr lvl="2"/>
             <a:r>
-              <a:rPr lang="en-US" smtClean="0"/>
+              <a:rPr lang="en-US"/>
               <a:t>Third level</a:t>
             </a:r>
           </a:p>
           <a:p>
             <a:pPr lvl="3"/>
             <a:r>
-              <a:rPr lang="en-US" smtClean="0"/>
+              <a:rPr lang="en-US"/>
               <a:t>Fourth level</a:t>
             </a:r>
           </a:p>
           <a:p>
             <a:pPr lvl="4"/>
             <a:r>
-              <a:rPr lang="en-US" smtClean="0"/>
+              <a:rPr lang="en-US"/>
               <a:t>Fifth level</a:t>
             </a:r>
-            <a:endParaRPr lang="en-US"/>
           </a:p>
         </p:txBody>
       </p:sp>
@@ -409,7 +411,7 @@
           <a:p>
             <a:fld id="{28BE630F-C39C-4DB9-8258-0B48CA067079}" type="datetimeFigureOut">
               <a:rPr lang="en-US" smtClean="0"/>
-              <a:t>11/25/2021</a:t>
+              <a:t>11/28/2021</a:t>
             </a:fld>
             <a:endParaRPr lang="en-US"/>
           </a:p>
@@ -508,10 +510,9 @@
           <a:lstStyle/>
           <a:p>
             <a:r>
-              <a:rPr lang="en-US" smtClean="0"/>
+              <a:rPr lang="en-US"/>
               <a:t>Click to edit Master title style</a:t>
             </a:r>
-            <a:endParaRPr lang="en-US"/>
           </a:p>
         </p:txBody>
       </p:sp>
@@ -537,38 +538,37 @@
           <a:p>
             <a:pPr lvl="0"/>
             <a:r>
-              <a:rPr lang="en-US" smtClean="0"/>
+              <a:rPr lang="en-US"/>
               <a:t>Click to edit Master text styles</a:t>
             </a:r>
           </a:p>
           <a:p>
             <a:pPr lvl="1"/>
             <a:r>
-              <a:rPr lang="en-US" smtClean="0"/>
+              <a:rPr lang="en-US"/>
               <a:t>Second level</a:t>
             </a:r>
           </a:p>
           <a:p>
             <a:pPr lvl="2"/>
             <a:r>
-              <a:rPr lang="en-US" smtClean="0"/>
+              <a:rPr lang="en-US"/>
               <a:t>Third level</a:t>
             </a:r>
           </a:p>
           <a:p>
             <a:pPr lvl="3"/>
             <a:r>
-              <a:rPr lang="en-US" smtClean="0"/>
+              <a:rPr lang="en-US"/>
               <a:t>Fourth level</a:t>
             </a:r>
           </a:p>
           <a:p>
             <a:pPr lvl="4"/>
             <a:r>
-              <a:rPr lang="en-US" smtClean="0"/>
+              <a:rPr lang="en-US"/>
               <a:t>Fifth level</a:t>
             </a:r>
-            <a:endParaRPr lang="en-US"/>
           </a:p>
         </p:txBody>
       </p:sp>
@@ -589,7 +589,7 @@
           <a:p>
             <a:fld id="{28BE630F-C39C-4DB9-8258-0B48CA067079}" type="datetimeFigureOut">
               <a:rPr lang="en-US" smtClean="0"/>
-              <a:t>11/25/2021</a:t>
+              <a:t>11/28/2021</a:t>
             </a:fld>
             <a:endParaRPr lang="en-US"/>
           </a:p>
@@ -683,10 +683,9 @@
           <a:lstStyle/>
           <a:p>
             <a:r>
-              <a:rPr lang="en-US" smtClean="0"/>
+              <a:rPr lang="en-US"/>
               <a:t>Click to edit Master title style</a:t>
             </a:r>
-            <a:endParaRPr lang="en-US"/>
           </a:p>
         </p:txBody>
       </p:sp>
@@ -707,38 +706,37 @@
           <a:p>
             <a:pPr lvl="0"/>
             <a:r>
-              <a:rPr lang="en-US" smtClean="0"/>
+              <a:rPr lang="en-US"/>
               <a:t>Click to edit Master text styles</a:t>
             </a:r>
           </a:p>
           <a:p>
             <a:pPr lvl="1"/>
             <a:r>
-              <a:rPr lang="en-US" smtClean="0"/>
+              <a:rPr lang="en-US"/>
               <a:t>Second level</a:t>
             </a:r>
           </a:p>
           <a:p>
             <a:pPr lvl="2"/>
             <a:r>
-              <a:rPr lang="en-US" smtClean="0"/>
+              <a:rPr lang="en-US"/>
               <a:t>Third level</a:t>
             </a:r>
           </a:p>
           <a:p>
             <a:pPr lvl="3"/>
             <a:r>
-              <a:rPr lang="en-US" smtClean="0"/>
+              <a:rPr lang="en-US"/>
               <a:t>Fourth level</a:t>
             </a:r>
           </a:p>
           <a:p>
             <a:pPr lvl="4"/>
             <a:r>
-              <a:rPr lang="en-US" smtClean="0"/>
+              <a:rPr lang="en-US"/>
               <a:t>Fifth level</a:t>
             </a:r>
-            <a:endParaRPr lang="en-US"/>
           </a:p>
         </p:txBody>
       </p:sp>
@@ -759,7 +757,7 @@
           <a:p>
             <a:fld id="{28BE630F-C39C-4DB9-8258-0B48CA067079}" type="datetimeFigureOut">
               <a:rPr lang="en-US" smtClean="0"/>
-              <a:t>11/25/2021</a:t>
+              <a:t>11/28/2021</a:t>
             </a:fld>
             <a:endParaRPr lang="en-US"/>
           </a:p>
@@ -862,10 +860,9 @@
           </a:lstStyle>
           <a:p>
             <a:r>
-              <a:rPr lang="en-US" smtClean="0"/>
+              <a:rPr lang="en-US"/>
               <a:t>Click to edit Master title style</a:t>
             </a:r>
-            <a:endParaRPr lang="en-US"/>
           </a:p>
         </p:txBody>
       </p:sp>
@@ -982,7 +979,7 @@
           <a:p>
             <a:pPr lvl="0"/>
             <a:r>
-              <a:rPr lang="en-US" smtClean="0"/>
+              <a:rPr lang="en-US"/>
               <a:t>Click to edit Master text styles</a:t>
             </a:r>
           </a:p>
@@ -1005,7 +1002,7 @@
           <a:p>
             <a:fld id="{28BE630F-C39C-4DB9-8258-0B48CA067079}" type="datetimeFigureOut">
               <a:rPr lang="en-US" smtClean="0"/>
-              <a:t>11/25/2021</a:t>
+              <a:t>11/28/2021</a:t>
             </a:fld>
             <a:endParaRPr lang="en-US"/>
           </a:p>
@@ -1099,10 +1096,9 @@
           <a:lstStyle/>
           <a:p>
             <a:r>
-              <a:rPr lang="en-US" smtClean="0"/>
+              <a:rPr lang="en-US"/>
               <a:t>Click to edit Master title style</a:t>
             </a:r>
-            <a:endParaRPr lang="en-US"/>
           </a:p>
         </p:txBody>
       </p:sp>
@@ -1128,38 +1124,37 @@
           <a:p>
             <a:pPr lvl="0"/>
             <a:r>
-              <a:rPr lang="en-US" smtClean="0"/>
+              <a:rPr lang="en-US"/>
               <a:t>Click to edit Master text styles</a:t>
             </a:r>
           </a:p>
           <a:p>
             <a:pPr lvl="1"/>
             <a:r>
-              <a:rPr lang="en-US" smtClean="0"/>
+              <a:rPr lang="en-US"/>
               <a:t>Second level</a:t>
             </a:r>
           </a:p>
           <a:p>
             <a:pPr lvl="2"/>
             <a:r>
-              <a:rPr lang="en-US" smtClean="0"/>
+              <a:rPr lang="en-US"/>
               <a:t>Third level</a:t>
             </a:r>
           </a:p>
           <a:p>
             <a:pPr lvl="3"/>
             <a:r>
-              <a:rPr lang="en-US" smtClean="0"/>
+              <a:rPr lang="en-US"/>
               <a:t>Fourth level</a:t>
             </a:r>
           </a:p>
           <a:p>
             <a:pPr lvl="4"/>
             <a:r>
-              <a:rPr lang="en-US" smtClean="0"/>
+              <a:rPr lang="en-US"/>
               <a:t>Fifth level</a:t>
             </a:r>
-            <a:endParaRPr lang="en-US"/>
           </a:p>
         </p:txBody>
       </p:sp>
@@ -1185,38 +1180,37 @@
           <a:p>
             <a:pPr lvl="0"/>
             <a:r>
-              <a:rPr lang="en-US" smtClean="0"/>
+              <a:rPr lang="en-US"/>
               <a:t>Click to edit Master text styles</a:t>
             </a:r>
           </a:p>
           <a:p>
             <a:pPr lvl="1"/>
             <a:r>
-              <a:rPr lang="en-US" smtClean="0"/>
+              <a:rPr lang="en-US"/>
               <a:t>Second level</a:t>
             </a:r>
           </a:p>
           <a:p>
             <a:pPr lvl="2"/>
             <a:r>
-              <a:rPr lang="en-US" smtClean="0"/>
+              <a:rPr lang="en-US"/>
               <a:t>Third level</a:t>
             </a:r>
           </a:p>
           <a:p>
             <a:pPr lvl="3"/>
             <a:r>
-              <a:rPr lang="en-US" smtClean="0"/>
+              <a:rPr lang="en-US"/>
               <a:t>Fourth level</a:t>
             </a:r>
           </a:p>
           <a:p>
             <a:pPr lvl="4"/>
             <a:r>
-              <a:rPr lang="en-US" smtClean="0"/>
+              <a:rPr lang="en-US"/>
               <a:t>Fifth level</a:t>
             </a:r>
-            <a:endParaRPr lang="en-US"/>
           </a:p>
         </p:txBody>
       </p:sp>
@@ -1237,7 +1231,7 @@
           <a:p>
             <a:fld id="{28BE630F-C39C-4DB9-8258-0B48CA067079}" type="datetimeFigureOut">
               <a:rPr lang="en-US" smtClean="0"/>
-              <a:t>11/25/2021</a:t>
+              <a:t>11/28/2021</a:t>
             </a:fld>
             <a:endParaRPr lang="en-US"/>
           </a:p>
@@ -1336,10 +1330,9 @@
           <a:lstStyle/>
           <a:p>
             <a:r>
-              <a:rPr lang="en-US" smtClean="0"/>
+              <a:rPr lang="en-US"/>
               <a:t>Click to edit Master title style</a:t>
             </a:r>
-            <a:endParaRPr lang="en-US"/>
           </a:p>
         </p:txBody>
       </p:sp>
@@ -1402,7 +1395,7 @@
           <a:p>
             <a:pPr lvl="0"/>
             <a:r>
-              <a:rPr lang="en-US" smtClean="0"/>
+              <a:rPr lang="en-US"/>
               <a:t>Click to edit Master text styles</a:t>
             </a:r>
           </a:p>
@@ -1430,38 +1423,37 @@
           <a:p>
             <a:pPr lvl="0"/>
             <a:r>
-              <a:rPr lang="en-US" smtClean="0"/>
+              <a:rPr lang="en-US"/>
               <a:t>Click to edit Master text styles</a:t>
             </a:r>
           </a:p>
           <a:p>
             <a:pPr lvl="1"/>
             <a:r>
-              <a:rPr lang="en-US" smtClean="0"/>
+              <a:rPr lang="en-US"/>
               <a:t>Second level</a:t>
             </a:r>
           </a:p>
           <a:p>
             <a:pPr lvl="2"/>
             <a:r>
-              <a:rPr lang="en-US" smtClean="0"/>
+              <a:rPr lang="en-US"/>
               <a:t>Third level</a:t>
             </a:r>
           </a:p>
           <a:p>
             <a:pPr lvl="3"/>
             <a:r>
-              <a:rPr lang="en-US" smtClean="0"/>
+              <a:rPr lang="en-US"/>
               <a:t>Fourth level</a:t>
             </a:r>
           </a:p>
           <a:p>
             <a:pPr lvl="4"/>
             <a:r>
-              <a:rPr lang="en-US" smtClean="0"/>
+              <a:rPr lang="en-US"/>
               <a:t>Fifth level</a:t>
             </a:r>
-            <a:endParaRPr lang="en-US"/>
           </a:p>
         </p:txBody>
       </p:sp>
@@ -1524,7 +1516,7 @@
           <a:p>
             <a:pPr lvl="0"/>
             <a:r>
-              <a:rPr lang="en-US" smtClean="0"/>
+              <a:rPr lang="en-US"/>
               <a:t>Click to edit Master text styles</a:t>
             </a:r>
           </a:p>
@@ -1552,38 +1544,37 @@
           <a:p>
             <a:pPr lvl="0"/>
             <a:r>
-              <a:rPr lang="en-US" smtClean="0"/>
+              <a:rPr lang="en-US"/>
               <a:t>Click to edit Master text styles</a:t>
             </a:r>
           </a:p>
           <a:p>
             <a:pPr lvl="1"/>
             <a:r>
-              <a:rPr lang="en-US" smtClean="0"/>
+              <a:rPr lang="en-US"/>
               <a:t>Second level</a:t>
             </a:r>
           </a:p>
           <a:p>
             <a:pPr lvl="2"/>
             <a:r>
-              <a:rPr lang="en-US" smtClean="0"/>
+              <a:rPr lang="en-US"/>
               <a:t>Third level</a:t>
             </a:r>
           </a:p>
           <a:p>
             <a:pPr lvl="3"/>
             <a:r>
-              <a:rPr lang="en-US" smtClean="0"/>
+              <a:rPr lang="en-US"/>
               <a:t>Fourth level</a:t>
             </a:r>
           </a:p>
           <a:p>
             <a:pPr lvl="4"/>
             <a:r>
-              <a:rPr lang="en-US" smtClean="0"/>
+              <a:rPr lang="en-US"/>
               <a:t>Fifth level</a:t>
             </a:r>
-            <a:endParaRPr lang="en-US"/>
           </a:p>
         </p:txBody>
       </p:sp>
@@ -1604,7 +1595,7 @@
           <a:p>
             <a:fld id="{28BE630F-C39C-4DB9-8258-0B48CA067079}" type="datetimeFigureOut">
               <a:rPr lang="en-US" smtClean="0"/>
-              <a:t>11/25/2021</a:t>
+              <a:t>11/28/2021</a:t>
             </a:fld>
             <a:endParaRPr lang="en-US"/>
           </a:p>
@@ -1698,10 +1689,9 @@
           <a:lstStyle/>
           <a:p>
             <a:r>
-              <a:rPr lang="en-US" smtClean="0"/>
+              <a:rPr lang="en-US"/>
               <a:t>Click to edit Master title style</a:t>
             </a:r>
-            <a:endParaRPr lang="en-US"/>
           </a:p>
         </p:txBody>
       </p:sp>
@@ -1722,7 +1712,7 @@
           <a:p>
             <a:fld id="{28BE630F-C39C-4DB9-8258-0B48CA067079}" type="datetimeFigureOut">
               <a:rPr lang="en-US" smtClean="0"/>
-              <a:t>11/25/2021</a:t>
+              <a:t>11/28/2021</a:t>
             </a:fld>
             <a:endParaRPr lang="en-US"/>
           </a:p>
@@ -1817,7 +1807,7 @@
           <a:p>
             <a:fld id="{28BE630F-C39C-4DB9-8258-0B48CA067079}" type="datetimeFigureOut">
               <a:rPr lang="en-US" smtClean="0"/>
-              <a:t>11/25/2021</a:t>
+              <a:t>11/28/2021</a:t>
             </a:fld>
             <a:endParaRPr lang="en-US"/>
           </a:p>
@@ -1920,10 +1910,9 @@
           </a:lstStyle>
           <a:p>
             <a:r>
-              <a:rPr lang="en-US" smtClean="0"/>
+              <a:rPr lang="en-US"/>
               <a:t>Click to edit Master title style</a:t>
             </a:r>
-            <a:endParaRPr lang="en-US"/>
           </a:p>
         </p:txBody>
       </p:sp>
@@ -1977,38 +1966,37 @@
           <a:p>
             <a:pPr lvl="0"/>
             <a:r>
-              <a:rPr lang="en-US" smtClean="0"/>
+              <a:rPr lang="en-US"/>
               <a:t>Click to edit Master text styles</a:t>
             </a:r>
           </a:p>
           <a:p>
             <a:pPr lvl="1"/>
             <a:r>
-              <a:rPr lang="en-US" smtClean="0"/>
+              <a:rPr lang="en-US"/>
               <a:t>Second level</a:t>
             </a:r>
           </a:p>
           <a:p>
             <a:pPr lvl="2"/>
             <a:r>
-              <a:rPr lang="en-US" smtClean="0"/>
+              <a:rPr lang="en-US"/>
               <a:t>Third level</a:t>
             </a:r>
           </a:p>
           <a:p>
             <a:pPr lvl="3"/>
             <a:r>
-              <a:rPr lang="en-US" smtClean="0"/>
+              <a:rPr lang="en-US"/>
               <a:t>Fourth level</a:t>
             </a:r>
           </a:p>
           <a:p>
             <a:pPr lvl="4"/>
             <a:r>
-              <a:rPr lang="en-US" smtClean="0"/>
+              <a:rPr lang="en-US"/>
               <a:t>Fifth level</a:t>
             </a:r>
-            <a:endParaRPr lang="en-US"/>
           </a:p>
         </p:txBody>
       </p:sp>
@@ -2071,7 +2059,7 @@
           <a:p>
             <a:pPr lvl="0"/>
             <a:r>
-              <a:rPr lang="en-US" smtClean="0"/>
+              <a:rPr lang="en-US"/>
               <a:t>Click to edit Master text styles</a:t>
             </a:r>
           </a:p>
@@ -2094,7 +2082,7 @@
           <a:p>
             <a:fld id="{28BE630F-C39C-4DB9-8258-0B48CA067079}" type="datetimeFigureOut">
               <a:rPr lang="en-US" smtClean="0"/>
-              <a:t>11/25/2021</a:t>
+              <a:t>11/28/2021</a:t>
             </a:fld>
             <a:endParaRPr lang="en-US"/>
           </a:p>
@@ -2197,10 +2185,9 @@
           </a:lstStyle>
           <a:p>
             <a:r>
-              <a:rPr lang="en-US" smtClean="0"/>
+              <a:rPr lang="en-US"/>
               <a:t>Click to edit Master title style</a:t>
             </a:r>
-            <a:endParaRPr lang="en-US"/>
           </a:p>
         </p:txBody>
       </p:sp>
@@ -2324,7 +2311,7 @@
           <a:p>
             <a:pPr lvl="0"/>
             <a:r>
-              <a:rPr lang="en-US" smtClean="0"/>
+              <a:rPr lang="en-US"/>
               <a:t>Click to edit Master text styles</a:t>
             </a:r>
           </a:p>
@@ -2347,7 +2334,7 @@
           <a:p>
             <a:fld id="{28BE630F-C39C-4DB9-8258-0B48CA067079}" type="datetimeFigureOut">
               <a:rPr lang="en-US" smtClean="0"/>
-              <a:t>11/25/2021</a:t>
+              <a:t>11/28/2021</a:t>
             </a:fld>
             <a:endParaRPr lang="en-US"/>
           </a:p>
@@ -2456,10 +2443,9 @@
           <a:lstStyle/>
           <a:p>
             <a:r>
-              <a:rPr lang="en-US" smtClean="0"/>
+              <a:rPr lang="en-US"/>
               <a:t>Click to edit Master title style</a:t>
             </a:r>
-            <a:endParaRPr lang="en-US"/>
           </a:p>
         </p:txBody>
       </p:sp>
@@ -2490,38 +2476,37 @@
           <a:p>
             <a:pPr lvl="0"/>
             <a:r>
-              <a:rPr lang="en-US" smtClean="0"/>
+              <a:rPr lang="en-US"/>
               <a:t>Click to edit Master text styles</a:t>
             </a:r>
           </a:p>
           <a:p>
             <a:pPr lvl="1"/>
             <a:r>
-              <a:rPr lang="en-US" smtClean="0"/>
+              <a:rPr lang="en-US"/>
               <a:t>Second level</a:t>
             </a:r>
           </a:p>
           <a:p>
             <a:pPr lvl="2"/>
             <a:r>
-              <a:rPr lang="en-US" smtClean="0"/>
+              <a:rPr lang="en-US"/>
               <a:t>Third level</a:t>
             </a:r>
           </a:p>
           <a:p>
             <a:pPr lvl="3"/>
             <a:r>
-              <a:rPr lang="en-US" smtClean="0"/>
+              <a:rPr lang="en-US"/>
               <a:t>Fourth level</a:t>
             </a:r>
           </a:p>
           <a:p>
             <a:pPr lvl="4"/>
             <a:r>
-              <a:rPr lang="en-US" smtClean="0"/>
+              <a:rPr lang="en-US"/>
               <a:t>Fifth level</a:t>
             </a:r>
-            <a:endParaRPr lang="en-US"/>
           </a:p>
         </p:txBody>
       </p:sp>
@@ -2560,7 +2545,7 @@
           <a:p>
             <a:fld id="{28BE630F-C39C-4DB9-8258-0B48CA067079}" type="datetimeFigureOut">
               <a:rPr lang="en-US" smtClean="0"/>
-              <a:t>11/25/2021</a:t>
+              <a:t>11/28/2021</a:t>
             </a:fld>
             <a:endParaRPr lang="en-US"/>
           </a:p>
@@ -3309,7 +3294,7 @@
         <p:spPr>
           <a:xfrm>
             <a:off x="885053" y="892284"/>
-            <a:ext cx="926857" cy="303481"/>
+            <a:ext cx="767198" cy="303481"/>
           </a:xfrm>
           <a:prstGeom prst="rect">
             <a:avLst/>
@@ -3323,10 +3308,9 @@
           <a:lstStyle/>
           <a:p>
             <a:r>
-              <a:rPr lang="en-US" sz="1372" dirty="0" smtClean="0"/>
-              <a:t>Students[]</a:t>
-            </a:r>
-            <a:endParaRPr lang="en-US" sz="1372" dirty="0"/>
+              <a:rPr lang="en-US" sz="1372" dirty="0"/>
+              <a:t>events[]</a:t>
+            </a:r>
           </a:p>
         </p:txBody>
       </p:sp>
@@ -3353,10 +3337,9 @@
           <a:lstStyle/>
           <a:p>
             <a:r>
-              <a:rPr lang="en-US" sz="1372" dirty="0" smtClean="0"/>
+              <a:rPr lang="en-US" sz="1372" dirty="0"/>
               <a:t>// A component with a list of student as data</a:t>
             </a:r>
-            <a:endParaRPr lang="en-US" sz="1372" dirty="0"/>
           </a:p>
         </p:txBody>
       </p:sp>
@@ -3449,7 +3432,7 @@
         <p:spPr>
           <a:xfrm>
             <a:off x="885053" y="2968734"/>
-            <a:ext cx="926857" cy="303481"/>
+            <a:ext cx="767198" cy="303481"/>
           </a:xfrm>
           <a:prstGeom prst="rect">
             <a:avLst/>
@@ -3463,10 +3446,9 @@
           <a:lstStyle/>
           <a:p>
             <a:r>
-              <a:rPr lang="en-US" sz="1372" dirty="0" smtClean="0"/>
-              <a:t>Students[]</a:t>
-            </a:r>
-            <a:endParaRPr lang="en-US" sz="1372" dirty="0"/>
+              <a:rPr lang="en-US" sz="1372" dirty="0"/>
+              <a:t>events[]</a:t>
+            </a:r>
           </a:p>
         </p:txBody>
       </p:sp>
@@ -3478,7 +3460,7 @@
         </p:nvSpPr>
         <p:spPr>
           <a:xfrm>
-            <a:off x="464251" y="3703715"/>
+            <a:off x="2002344" y="6499738"/>
             <a:ext cx="2183996" cy="303481"/>
           </a:xfrm>
           <a:prstGeom prst="rect">
@@ -3493,11 +3475,11 @@
           <a:lstStyle/>
           <a:p>
             <a:r>
-              <a:rPr lang="en-US" sz="1372" dirty="0" smtClean="0"/>
+              <a:rPr lang="en-US" sz="1372" dirty="0"/>
               <a:t>// </a:t>
             </a:r>
             <a:r>
-              <a:rPr lang="en-US" sz="1372" dirty="0" smtClean="0">
+              <a:rPr lang="en-US" sz="1372" dirty="0">
                 <a:solidFill>
                   <a:srgbClr val="FF0000"/>
                 </a:solidFill>
@@ -3505,22 +3487,17 @@
               <a:t>app</a:t>
             </a:r>
             <a:r>
-              <a:rPr lang="en-US" sz="1372" dirty="0" smtClean="0"/>
+              <a:rPr lang="en-US" sz="1372" dirty="0"/>
               <a:t> send student to </a:t>
             </a:r>
             <a:r>
-              <a:rPr lang="en-US" sz="1372" dirty="0" smtClean="0">
+              <a:rPr lang="en-US" sz="1372" dirty="0">
                 <a:solidFill>
                   <a:srgbClr val="FF0000"/>
                 </a:solidFill>
               </a:rPr>
               <a:t>card </a:t>
             </a:r>
-            <a:endParaRPr lang="en-US" sz="1372" dirty="0">
-              <a:solidFill>
-                <a:srgbClr val="FF0000"/>
-              </a:solidFill>
-            </a:endParaRPr>
           </a:p>
         </p:txBody>
       </p:sp>
@@ -3533,7 +3510,7 @@
         <p:spPr>
           <a:xfrm>
             <a:off x="1009380" y="4803105"/>
-            <a:ext cx="848309" cy="303481"/>
+            <a:ext cx="360996" cy="303481"/>
           </a:xfrm>
           <a:prstGeom prst="rect">
             <a:avLst/>
@@ -3547,18 +3524,13 @@
           <a:lstStyle/>
           <a:p>
             <a:r>
-              <a:rPr lang="en-US" sz="1372" b="1" i="1" dirty="0" smtClean="0">
+              <a:rPr lang="en-US" sz="1372" b="1" i="1" dirty="0">
                 <a:solidFill>
                   <a:srgbClr val="FF0000"/>
                 </a:solidFill>
               </a:rPr>
-              <a:t>&lt;parent&gt;</a:t>
-            </a:r>
-            <a:endParaRPr lang="en-US" sz="1372" b="1" i="1" dirty="0">
-              <a:solidFill>
-                <a:srgbClr val="FF0000"/>
-              </a:solidFill>
-            </a:endParaRPr>
+              <a:t>&lt;&gt;</a:t>
+            </a:r>
           </a:p>
         </p:txBody>
       </p:sp>
@@ -3570,7 +3542,7 @@
         </p:nvSpPr>
         <p:spPr>
           <a:xfrm>
-            <a:off x="523323" y="4632524"/>
+            <a:off x="523323" y="4307209"/>
             <a:ext cx="1650319" cy="1166483"/>
           </a:xfrm>
           <a:prstGeom prst="roundRect">
@@ -3632,10 +3604,9 @@
           <a:lstStyle/>
           <a:p>
             <a:r>
-              <a:rPr lang="en-US" sz="1372" dirty="0" smtClean="0"/>
+              <a:rPr lang="en-US" sz="1372" dirty="0"/>
               <a:t>Students[]</a:t>
             </a:r>
-            <a:endParaRPr lang="en-US" sz="1372" dirty="0"/>
           </a:p>
         </p:txBody>
       </p:sp>
@@ -3662,11 +3633,11 @@
           <a:lstStyle/>
           <a:p>
             <a:r>
-              <a:rPr lang="en-US" sz="1372" dirty="0" smtClean="0"/>
+              <a:rPr lang="en-US" sz="1372" dirty="0"/>
               <a:t>// </a:t>
             </a:r>
             <a:r>
-              <a:rPr lang="en-US" sz="1372" dirty="0" smtClean="0">
+              <a:rPr lang="en-US" sz="1372" dirty="0">
                 <a:solidFill>
                   <a:srgbClr val="FF0000"/>
                 </a:solidFill>
@@ -3674,22 +3645,17 @@
               <a:t>from</a:t>
             </a:r>
             <a:r>
-              <a:rPr lang="en-US" sz="1372" dirty="0" smtClean="0"/>
+              <a:rPr lang="en-US" sz="1372" dirty="0"/>
               <a:t> send the event validated to </a:t>
             </a:r>
             <a:r>
-              <a:rPr lang="en-US" sz="1372" dirty="0" smtClean="0">
+              <a:rPr lang="en-US" sz="1372" dirty="0">
                 <a:solidFill>
                   <a:srgbClr val="FF0000"/>
                 </a:solidFill>
               </a:rPr>
               <a:t>parent</a:t>
             </a:r>
-            <a:endParaRPr lang="en-US" sz="1372" dirty="0">
-              <a:solidFill>
-                <a:srgbClr val="FF0000"/>
-              </a:solidFill>
-            </a:endParaRPr>
           </a:p>
         </p:txBody>
       </p:sp>
@@ -3748,8 +3714,8 @@
         </p:nvSpPr>
         <p:spPr>
           <a:xfrm>
-            <a:off x="3418703" y="2992027"/>
-            <a:ext cx="926857" cy="303481"/>
+            <a:off x="3449216" y="2980907"/>
+            <a:ext cx="670568" cy="303481"/>
           </a:xfrm>
           <a:prstGeom prst="rect">
             <a:avLst/>
@@ -3763,10 +3729,9 @@
           <a:lstStyle/>
           <a:p>
             <a:r>
-              <a:rPr lang="en-US" sz="1372" dirty="0" smtClean="0"/>
-              <a:t>Students[]</a:t>
-            </a:r>
-            <a:endParaRPr lang="en-US" sz="1372" dirty="0"/>
+              <a:rPr lang="en-US" sz="1372" dirty="0"/>
+              <a:t>users[]</a:t>
+            </a:r>
           </a:p>
         </p:txBody>
       </p:sp>
@@ -3793,18 +3758,13 @@
           <a:lstStyle/>
           <a:p>
             <a:r>
-              <a:rPr lang="en-US" sz="1372" b="1" i="1" dirty="0" smtClean="0">
+              <a:rPr lang="en-US" sz="1372" b="1" i="1" dirty="0">
                 <a:solidFill>
                   <a:srgbClr val="FF0000"/>
                 </a:solidFill>
               </a:rPr>
               <a:t>&lt;from&gt;</a:t>
             </a:r>
-            <a:endParaRPr lang="en-US" sz="1372" b="1" i="1" dirty="0">
-              <a:solidFill>
-                <a:srgbClr val="FF0000"/>
-              </a:solidFill>
-            </a:endParaRPr>
           </a:p>
         </p:txBody>
       </p:sp>
@@ -3878,10 +3838,9 @@
           <a:lstStyle/>
           <a:p>
             <a:r>
-              <a:rPr lang="en-US" sz="1372" dirty="0" smtClean="0"/>
+              <a:rPr lang="en-US" sz="1372" dirty="0"/>
               <a:t>Students[]</a:t>
             </a:r>
-            <a:endParaRPr lang="en-US" sz="1372" dirty="0"/>
           </a:p>
         </p:txBody>
       </p:sp>
@@ -3942,7 +3901,7 @@
         <p:spPr>
           <a:xfrm>
             <a:off x="2156606" y="3120474"/>
-            <a:ext cx="735714" cy="303481"/>
+            <a:ext cx="561564" cy="303481"/>
           </a:xfrm>
           <a:prstGeom prst="rect">
             <a:avLst/>
@@ -3956,10 +3915,9 @@
           <a:lstStyle/>
           <a:p>
             <a:r>
-              <a:rPr lang="en-US" sz="1372" dirty="0" smtClean="0"/>
-              <a:t>student</a:t>
-            </a:r>
-            <a:endParaRPr lang="en-US" sz="1372" dirty="0"/>
+              <a:rPr lang="en-US" sz="1372" dirty="0"/>
+              <a:t>users</a:t>
+            </a:r>
           </a:p>
         </p:txBody>
       </p:sp>
@@ -3986,18 +3944,13 @@
           <a:lstStyle/>
           <a:p>
             <a:r>
-              <a:rPr lang="en-US" sz="1372" b="1" dirty="0" smtClean="0">
+              <a:rPr lang="en-US" sz="1372" b="1" dirty="0">
                 <a:solidFill>
                   <a:schemeClr val="accent6"/>
                 </a:solidFill>
               </a:rPr>
               <a:t>PROPS</a:t>
             </a:r>
-            <a:endParaRPr lang="en-US" sz="1372" b="1" dirty="0">
-              <a:solidFill>
-                <a:schemeClr val="accent6"/>
-              </a:solidFill>
-            </a:endParaRPr>
           </a:p>
         </p:txBody>
       </p:sp>
@@ -4009,8 +3962,8 @@
         </p:nvSpPr>
         <p:spPr>
           <a:xfrm>
-            <a:off x="3562171" y="2587817"/>
-            <a:ext cx="680251" cy="303481"/>
+            <a:off x="3215762" y="2513749"/>
+            <a:ext cx="1432315" cy="303481"/>
           </a:xfrm>
           <a:prstGeom prst="rect">
             <a:avLst/>
@@ -4024,18 +3977,13 @@
           <a:lstStyle/>
           <a:p>
             <a:r>
-              <a:rPr lang="en-US" sz="1372" b="1" i="1" dirty="0" smtClean="0">
+              <a:rPr lang="en-US" sz="1372" b="1" i="1" dirty="0">
                 <a:solidFill>
                   <a:srgbClr val="FF0000"/>
                 </a:solidFill>
               </a:rPr>
-              <a:t>&lt;card&gt;</a:t>
-            </a:r>
-            <a:endParaRPr lang="en-US" sz="1372" b="1" i="1" dirty="0">
-              <a:solidFill>
-                <a:srgbClr val="FF0000"/>
-              </a:solidFill>
-            </a:endParaRPr>
+              <a:t>&lt;sign in/sign up&gt;</a:t>
+            </a:r>
           </a:p>
         </p:txBody>
       </p:sp>
@@ -4110,7 +4058,7 @@
           <a:lstStyle/>
           <a:p>
             <a:r>
-              <a:rPr lang="en-US" sz="1372" dirty="0" err="1" smtClean="0"/>
+              <a:rPr lang="en-US" sz="1372" dirty="0" err="1"/>
               <a:t>valided</a:t>
             </a:r>
             <a:endParaRPr lang="en-US" sz="1372" dirty="0"/>
@@ -4140,18 +4088,13 @@
           <a:lstStyle/>
           <a:p>
             <a:r>
-              <a:rPr lang="en-US" sz="1372" b="1" dirty="0" smtClean="0">
+              <a:rPr lang="en-US" sz="1372" b="1" dirty="0">
                 <a:solidFill>
                   <a:srgbClr val="FF0000"/>
                 </a:solidFill>
               </a:rPr>
               <a:t>EMIT</a:t>
             </a:r>
-            <a:endParaRPr lang="en-US" sz="1372" b="1" dirty="0">
-              <a:solidFill>
-                <a:srgbClr val="FF0000"/>
-              </a:solidFill>
-            </a:endParaRPr>
           </a:p>
         </p:txBody>
       </p:sp>
@@ -4288,10 +4231,9 @@
           <a:lstStyle/>
           <a:p>
             <a:r>
-              <a:rPr lang="en-US" sz="1372" dirty="0" smtClean="0"/>
+              <a:rPr lang="en-US" sz="1372" dirty="0"/>
               <a:t>Students[]</a:t>
             </a:r>
-            <a:endParaRPr lang="en-US" sz="1372" dirty="0"/>
           </a:p>
         </p:txBody>
       </p:sp>
@@ -4303,7 +4245,7 @@
         </p:nvSpPr>
         <p:spPr>
           <a:xfrm>
-            <a:off x="6234390" y="1613780"/>
+            <a:off x="6268318" y="1605338"/>
             <a:ext cx="2858411" cy="303481"/>
           </a:xfrm>
           <a:prstGeom prst="rect">
@@ -4318,11 +4260,11 @@
           <a:lstStyle/>
           <a:p>
             <a:r>
-              <a:rPr lang="en-US" sz="1372" dirty="0" smtClean="0"/>
+              <a:rPr lang="en-US" sz="1372" dirty="0"/>
               <a:t>// </a:t>
             </a:r>
             <a:r>
-              <a:rPr lang="en-US" sz="1372" dirty="0" smtClean="0">
+              <a:rPr lang="en-US" sz="1372" dirty="0">
                 <a:solidFill>
                   <a:srgbClr val="FF0000"/>
                 </a:solidFill>
@@ -4330,7 +4272,7 @@
               <a:t>app</a:t>
             </a:r>
             <a:r>
-              <a:rPr lang="en-US" sz="1372" dirty="0" smtClean="0"/>
+              <a:rPr lang="en-US" sz="1372" dirty="0"/>
               <a:t>  provides students to anymore</a:t>
             </a:r>
             <a:endParaRPr lang="en-US" sz="1372" dirty="0">
@@ -4349,7 +4291,7 @@
         </p:nvSpPr>
         <p:spPr>
           <a:xfrm>
-            <a:off x="9792269" y="2129025"/>
+            <a:off x="10541681" y="1242303"/>
             <a:ext cx="1650319" cy="1166483"/>
           </a:xfrm>
           <a:prstGeom prst="roundRect">
@@ -4411,10 +4353,9 @@
           <a:lstStyle/>
           <a:p>
             <a:r>
-              <a:rPr lang="en-US" sz="1372" dirty="0" smtClean="0"/>
+              <a:rPr lang="en-US" sz="1372" dirty="0"/>
               <a:t>Students[]</a:t>
             </a:r>
-            <a:endParaRPr lang="en-US" sz="1372" dirty="0"/>
           </a:p>
         </p:txBody>
       </p:sp>
@@ -4426,7 +4367,7 @@
         </p:nvSpPr>
         <p:spPr>
           <a:xfrm>
-            <a:off x="10297467" y="2308056"/>
+            <a:off x="10964246" y="1342041"/>
             <a:ext cx="819455" cy="303481"/>
           </a:xfrm>
           <a:prstGeom prst="rect">
@@ -4441,18 +4382,13 @@
           <a:lstStyle/>
           <a:p>
             <a:r>
-              <a:rPr lang="en-US" sz="1372" b="1" i="1" dirty="0" smtClean="0">
+              <a:rPr lang="en-US" sz="1372" b="1" i="1" dirty="0">
                 <a:solidFill>
                   <a:srgbClr val="FF0000"/>
                 </a:solidFill>
               </a:rPr>
               <a:t>&lt;dialog&gt;</a:t>
             </a:r>
-            <a:endParaRPr lang="en-US" sz="1372" b="1" i="1" dirty="0">
-              <a:solidFill>
-                <a:srgbClr val="FF0000"/>
-              </a:solidFill>
-            </a:endParaRPr>
           </a:p>
         </p:txBody>
       </p:sp>
@@ -4560,10 +4496,9 @@
           <a:lstStyle/>
           <a:p>
             <a:r>
-              <a:rPr lang="en-US" sz="1372" dirty="0" smtClean="0"/>
+              <a:rPr lang="en-US" sz="1372" dirty="0"/>
               <a:t>Students[]</a:t>
             </a:r>
-            <a:endParaRPr lang="en-US" sz="1372" dirty="0"/>
           </a:p>
         </p:txBody>
       </p:sp>
@@ -4638,18 +4573,13 @@
           <a:lstStyle/>
           <a:p>
             <a:r>
-              <a:rPr lang="en-US" sz="1372" b="1" dirty="0" smtClean="0">
+              <a:rPr lang="en-US" sz="1372" b="1" dirty="0">
                 <a:solidFill>
                   <a:schemeClr val="accent4"/>
                 </a:solidFill>
               </a:rPr>
               <a:t>INJECT</a:t>
             </a:r>
-            <a:endParaRPr lang="en-US" sz="1372" b="1" dirty="0">
-              <a:solidFill>
-                <a:schemeClr val="accent4"/>
-              </a:solidFill>
-            </a:endParaRPr>
           </a:p>
         </p:txBody>
       </p:sp>
@@ -4676,10 +4606,9 @@
           <a:lstStyle/>
           <a:p>
             <a:r>
-              <a:rPr lang="en-US" sz="1372" dirty="0" smtClean="0"/>
+              <a:rPr lang="en-US" sz="1372" dirty="0"/>
               <a:t>Students[]</a:t>
             </a:r>
-            <a:endParaRPr lang="en-US" sz="1372" dirty="0"/>
           </a:p>
         </p:txBody>
       </p:sp>
@@ -4691,7 +4620,7 @@
         </p:nvSpPr>
         <p:spPr>
           <a:xfrm>
-            <a:off x="8917907" y="3423528"/>
+            <a:off x="9280415" y="5631091"/>
             <a:ext cx="2987100" cy="303481"/>
           </a:xfrm>
           <a:prstGeom prst="rect">
@@ -4706,11 +4635,11 @@
           <a:lstStyle/>
           <a:p>
             <a:r>
-              <a:rPr lang="en-US" sz="1372" dirty="0" smtClean="0"/>
+              <a:rPr lang="en-US" sz="1372" dirty="0"/>
               <a:t>// </a:t>
             </a:r>
             <a:r>
-              <a:rPr lang="en-US" sz="1372" dirty="0" smtClean="0">
+              <a:rPr lang="en-US" sz="1372" dirty="0">
                 <a:solidFill>
                   <a:srgbClr val="FF0000"/>
                 </a:solidFill>
@@ -4718,7 +4647,7 @@
               <a:t>dialog </a:t>
             </a:r>
             <a:r>
-              <a:rPr lang="en-US" sz="1372" dirty="0" smtClean="0"/>
+              <a:rPr lang="en-US" sz="1372" dirty="0"/>
               <a:t> gets students from a provider</a:t>
             </a:r>
             <a:endParaRPr lang="en-US" sz="1372" dirty="0">
@@ -4737,7 +4666,7 @@
         </p:nvSpPr>
         <p:spPr>
           <a:xfrm>
-            <a:off x="6561502" y="4305380"/>
+            <a:off x="7542023" y="3073484"/>
             <a:ext cx="1215717" cy="303481"/>
           </a:xfrm>
           <a:prstGeom prst="rect">
@@ -4770,7 +4699,7 @@
         </p:nvSpPr>
         <p:spPr>
           <a:xfrm>
-            <a:off x="6217868" y="4170157"/>
+            <a:off x="6426893" y="5763814"/>
             <a:ext cx="1866945" cy="584334"/>
           </a:xfrm>
           <a:prstGeom prst="roundRect">
@@ -4817,7 +4746,7 @@
         </p:nvSpPr>
         <p:spPr>
           <a:xfrm>
-            <a:off x="8256742" y="4317805"/>
+            <a:off x="8431980" y="6531739"/>
             <a:ext cx="2229136" cy="303481"/>
           </a:xfrm>
           <a:prstGeom prst="rect">
@@ -4832,15 +4761,15 @@
           <a:lstStyle/>
           <a:p>
             <a:r>
-              <a:rPr lang="en-US" sz="1372" dirty="0" smtClean="0"/>
+              <a:rPr lang="en-US" sz="1372" dirty="0"/>
               <a:t>// </a:t>
             </a:r>
             <a:r>
-              <a:rPr lang="en-US" sz="1372" dirty="0" err="1" smtClean="0"/>
+              <a:rPr lang="en-US" sz="1372" dirty="0" err="1"/>
               <a:t>Vue</a:t>
             </a:r>
             <a:r>
-              <a:rPr lang="en-US" sz="1372" dirty="0" smtClean="0"/>
+              <a:rPr lang="en-US" sz="1372" dirty="0"/>
               <a:t> JS built-in component</a:t>
             </a:r>
             <a:endParaRPr lang="en-US" sz="1372" dirty="0">
@@ -4851,10 +4780,1391 @@
           </a:p>
         </p:txBody>
       </p:sp>
+      <p:cxnSp>
+        <p:nvCxnSpPr>
+          <p:cNvPr id="3" name="Straight Arrow Connector 2">
+            <a:extLst>
+              <a:ext uri="{FF2B5EF4-FFF2-40B4-BE49-F238E27FC236}">
+                <a16:creationId xmlns:a16="http://schemas.microsoft.com/office/drawing/2014/main" id="{16642741-8181-4FF4-8F11-092678CA01D7}"/>
+              </a:ext>
+            </a:extLst>
+          </p:cNvPr>
+          <p:cNvCxnSpPr>
+            <a:stCxn id="9" idx="2"/>
+            <a:endCxn id="13" idx="0"/>
+          </p:cNvCxnSpPr>
+          <p:nvPr/>
+        </p:nvCxnSpPr>
+        <p:spPr>
+          <a:xfrm>
+            <a:off x="1348483" y="3551976"/>
+            <a:ext cx="0" cy="755233"/>
+          </a:xfrm>
+          <a:prstGeom prst="straightConnector1">
+            <a:avLst/>
+          </a:prstGeom>
+          <a:ln>
+            <a:tailEnd type="triangle"/>
+          </a:ln>
+        </p:spPr>
+        <p:style>
+          <a:lnRef idx="1">
+            <a:schemeClr val="accent1"/>
+          </a:lnRef>
+          <a:fillRef idx="0">
+            <a:schemeClr val="accent1"/>
+          </a:fillRef>
+          <a:effectRef idx="0">
+            <a:schemeClr val="accent1"/>
+          </a:effectRef>
+          <a:fontRef idx="minor">
+            <a:schemeClr val="tx1"/>
+          </a:fontRef>
+        </p:style>
+      </p:cxnSp>
     </p:spTree>
     <p:extLst>
       <p:ext uri="{BB962C8B-B14F-4D97-AF65-F5344CB8AC3E}">
         <p14:creationId xmlns:p14="http://schemas.microsoft.com/office/powerpoint/2010/main" val="3109588190"/>
+      </p:ext>
+    </p:extLst>
+  </p:cSld>
+  <p:clrMapOvr>
+    <a:masterClrMapping/>
+  </p:clrMapOvr>
+</p:sld>
+</file>
+
+<file path=ppt/slides/slide3.xml><?xml version="1.0" encoding="utf-8"?>
+<p:sld xmlns:a="http://schemas.openxmlformats.org/drawingml/2006/main" xmlns:r="http://schemas.openxmlformats.org/officeDocument/2006/relationships" xmlns:p="http://schemas.openxmlformats.org/presentationml/2006/main">
+  <p:cSld>
+    <p:spTree>
+      <p:nvGrpSpPr>
+        <p:cNvPr id="1" name=""/>
+        <p:cNvGrpSpPr/>
+        <p:nvPr/>
+      </p:nvGrpSpPr>
+      <p:grpSpPr>
+        <a:xfrm>
+          <a:off x="0" y="0"/>
+          <a:ext cx="0" cy="0"/>
+          <a:chOff x="0" y="0"/>
+          <a:chExt cx="0" cy="0"/>
+        </a:xfrm>
+      </p:grpSpPr>
+      <p:sp>
+        <p:nvSpPr>
+          <p:cNvPr id="4" name="TextBox 3">
+            <a:extLst>
+              <a:ext uri="{FF2B5EF4-FFF2-40B4-BE49-F238E27FC236}">
+                <a16:creationId xmlns:a16="http://schemas.microsoft.com/office/drawing/2014/main" id="{2CCF02E6-F26D-497B-B3EA-592A73CD0BBA}"/>
+              </a:ext>
+            </a:extLst>
+          </p:cNvPr>
+          <p:cNvSpPr txBox="1"/>
+          <p:nvPr/>
+        </p:nvSpPr>
+        <p:spPr>
+          <a:xfrm>
+            <a:off x="5394787" y="3785150"/>
+            <a:ext cx="639919" cy="303481"/>
+          </a:xfrm>
+          <a:prstGeom prst="rect">
+            <a:avLst/>
+          </a:prstGeom>
+          <a:noFill/>
+        </p:spPr>
+        <p:txBody>
+          <a:bodyPr wrap="none" rtlCol="0">
+            <a:spAutoFit/>
+          </a:bodyPr>
+          <a:lstStyle/>
+          <a:p>
+            <a:r>
+              <a:rPr lang="en-US" sz="1372" b="1" i="1" dirty="0">
+                <a:solidFill>
+                  <a:srgbClr val="FF0000"/>
+                </a:solidFill>
+              </a:rPr>
+              <a:t>&lt;app&gt;</a:t>
+            </a:r>
+          </a:p>
+        </p:txBody>
+      </p:sp>
+      <p:sp>
+        <p:nvSpPr>
+          <p:cNvPr id="5" name="Rounded Rectangle 4">
+            <a:extLst>
+              <a:ext uri="{FF2B5EF4-FFF2-40B4-BE49-F238E27FC236}">
+                <a16:creationId xmlns:a16="http://schemas.microsoft.com/office/drawing/2014/main" id="{2F47F51C-3625-4839-9158-55851A7FCD55}"/>
+              </a:ext>
+            </a:extLst>
+          </p:cNvPr>
+          <p:cNvSpPr/>
+          <p:nvPr/>
+        </p:nvSpPr>
+        <p:spPr>
+          <a:xfrm>
+            <a:off x="1268652" y="523804"/>
+            <a:ext cx="1650319" cy="1166483"/>
+          </a:xfrm>
+          <a:prstGeom prst="roundRect">
+            <a:avLst/>
+          </a:prstGeom>
+          <a:noFill/>
+          <a:ln>
+            <a:solidFill>
+              <a:srgbClr val="FF0000"/>
+            </a:solidFill>
+            <a:prstDash val="lgDash"/>
+          </a:ln>
+        </p:spPr>
+        <p:style>
+          <a:lnRef idx="2">
+            <a:schemeClr val="accent1">
+              <a:shade val="50000"/>
+            </a:schemeClr>
+          </a:lnRef>
+          <a:fillRef idx="1">
+            <a:schemeClr val="accent1"/>
+          </a:fillRef>
+          <a:effectRef idx="0">
+            <a:schemeClr val="accent1"/>
+          </a:effectRef>
+          <a:fontRef idx="minor">
+            <a:schemeClr val="lt1"/>
+          </a:fontRef>
+        </p:style>
+        <p:txBody>
+          <a:bodyPr rtlCol="0" anchor="ctr"/>
+          <a:lstStyle/>
+          <a:p>
+            <a:pPr algn="ctr"/>
+            <a:endParaRPr lang="en-US" sz="1372"/>
+          </a:p>
+        </p:txBody>
+      </p:sp>
+      <p:sp>
+        <p:nvSpPr>
+          <p:cNvPr id="6" name="TextBox 5">
+            <a:extLst>
+              <a:ext uri="{FF2B5EF4-FFF2-40B4-BE49-F238E27FC236}">
+                <a16:creationId xmlns:a16="http://schemas.microsoft.com/office/drawing/2014/main" id="{3BC86C56-B9C7-4132-A68B-A49555ABFBA5}"/>
+              </a:ext>
+            </a:extLst>
+          </p:cNvPr>
+          <p:cNvSpPr txBox="1"/>
+          <p:nvPr/>
+        </p:nvSpPr>
+        <p:spPr>
+          <a:xfrm>
+            <a:off x="5394787" y="4088631"/>
+            <a:ext cx="767198" cy="303481"/>
+          </a:xfrm>
+          <a:prstGeom prst="rect">
+            <a:avLst/>
+          </a:prstGeom>
+          <a:noFill/>
+        </p:spPr>
+        <p:txBody>
+          <a:bodyPr wrap="none" rtlCol="0">
+            <a:spAutoFit/>
+          </a:bodyPr>
+          <a:lstStyle/>
+          <a:p>
+            <a:r>
+              <a:rPr lang="en-US" sz="1372" dirty="0"/>
+              <a:t>events[]</a:t>
+            </a:r>
+          </a:p>
+        </p:txBody>
+      </p:sp>
+      <p:sp>
+        <p:nvSpPr>
+          <p:cNvPr id="7" name="TextBox 6">
+            <a:extLst>
+              <a:ext uri="{FF2B5EF4-FFF2-40B4-BE49-F238E27FC236}">
+                <a16:creationId xmlns:a16="http://schemas.microsoft.com/office/drawing/2014/main" id="{9479004F-F0FE-4B40-A93C-DBCCB3C65171}"/>
+              </a:ext>
+            </a:extLst>
+          </p:cNvPr>
+          <p:cNvSpPr txBox="1"/>
+          <p:nvPr/>
+        </p:nvSpPr>
+        <p:spPr>
+          <a:xfrm>
+            <a:off x="1773851" y="566772"/>
+            <a:ext cx="1060034" cy="303481"/>
+          </a:xfrm>
+          <a:prstGeom prst="rect">
+            <a:avLst/>
+          </a:prstGeom>
+          <a:noFill/>
+        </p:spPr>
+        <p:txBody>
+          <a:bodyPr wrap="none" rtlCol="0">
+            <a:spAutoFit/>
+          </a:bodyPr>
+          <a:lstStyle/>
+          <a:p>
+            <a:r>
+              <a:rPr lang="en-US" sz="1372" b="1" i="1" dirty="0">
+                <a:solidFill>
+                  <a:srgbClr val="FF0000"/>
+                </a:solidFill>
+              </a:rPr>
+              <a:t>&lt;My-event&gt;</a:t>
+            </a:r>
+          </a:p>
+        </p:txBody>
+      </p:sp>
+      <p:sp>
+        <p:nvSpPr>
+          <p:cNvPr id="8" name="Rounded Rectangle 8">
+            <a:extLst>
+              <a:ext uri="{FF2B5EF4-FFF2-40B4-BE49-F238E27FC236}">
+                <a16:creationId xmlns:a16="http://schemas.microsoft.com/office/drawing/2014/main" id="{7611D870-3DD9-4927-9E0D-33510A14B1F3}"/>
+              </a:ext>
+            </a:extLst>
+          </p:cNvPr>
+          <p:cNvSpPr/>
+          <p:nvPr/>
+        </p:nvSpPr>
+        <p:spPr>
+          <a:xfrm>
+            <a:off x="8135173" y="3400051"/>
+            <a:ext cx="1650319" cy="1166483"/>
+          </a:xfrm>
+          <a:prstGeom prst="roundRect">
+            <a:avLst/>
+          </a:prstGeom>
+          <a:noFill/>
+          <a:ln>
+            <a:solidFill>
+              <a:srgbClr val="FF0000"/>
+            </a:solidFill>
+            <a:prstDash val="lgDash"/>
+          </a:ln>
+        </p:spPr>
+        <p:style>
+          <a:lnRef idx="2">
+            <a:schemeClr val="accent1">
+              <a:shade val="50000"/>
+            </a:schemeClr>
+          </a:lnRef>
+          <a:fillRef idx="1">
+            <a:schemeClr val="accent1"/>
+          </a:fillRef>
+          <a:effectRef idx="0">
+            <a:schemeClr val="accent1"/>
+          </a:effectRef>
+          <a:fontRef idx="minor">
+            <a:schemeClr val="lt1"/>
+          </a:fontRef>
+        </p:style>
+        <p:txBody>
+          <a:bodyPr rtlCol="0" anchor="ctr"/>
+          <a:lstStyle/>
+          <a:p>
+            <a:pPr algn="ctr"/>
+            <a:endParaRPr lang="en-US" sz="1372"/>
+          </a:p>
+        </p:txBody>
+      </p:sp>
+      <p:sp>
+        <p:nvSpPr>
+          <p:cNvPr id="9" name="TextBox 8">
+            <a:extLst>
+              <a:ext uri="{FF2B5EF4-FFF2-40B4-BE49-F238E27FC236}">
+                <a16:creationId xmlns:a16="http://schemas.microsoft.com/office/drawing/2014/main" id="{A9F342E3-39AD-4265-959B-978F3C7FD8C1}"/>
+              </a:ext>
+            </a:extLst>
+          </p:cNvPr>
+          <p:cNvSpPr txBox="1"/>
+          <p:nvPr/>
+        </p:nvSpPr>
+        <p:spPr>
+          <a:xfrm>
+            <a:off x="8662842" y="3637712"/>
+            <a:ext cx="698268" cy="303481"/>
+          </a:xfrm>
+          <a:prstGeom prst="rect">
+            <a:avLst/>
+          </a:prstGeom>
+          <a:noFill/>
+        </p:spPr>
+        <p:txBody>
+          <a:bodyPr wrap="none" rtlCol="0">
+            <a:spAutoFit/>
+          </a:bodyPr>
+          <a:lstStyle/>
+          <a:p>
+            <a:r>
+              <a:rPr lang="en-US" sz="1372" dirty="0"/>
+              <a:t>event[]</a:t>
+            </a:r>
+          </a:p>
+        </p:txBody>
+      </p:sp>
+      <p:sp>
+        <p:nvSpPr>
+          <p:cNvPr id="12" name="Rounded Rectangle 12">
+            <a:extLst>
+              <a:ext uri="{FF2B5EF4-FFF2-40B4-BE49-F238E27FC236}">
+                <a16:creationId xmlns:a16="http://schemas.microsoft.com/office/drawing/2014/main" id="{7A481E5D-7A73-444C-8A56-C7083EBF7502}"/>
+              </a:ext>
+            </a:extLst>
+          </p:cNvPr>
+          <p:cNvSpPr/>
+          <p:nvPr/>
+        </p:nvSpPr>
+        <p:spPr>
+          <a:xfrm>
+            <a:off x="4889587" y="3785150"/>
+            <a:ext cx="1650319" cy="1166483"/>
+          </a:xfrm>
+          <a:prstGeom prst="roundRect">
+            <a:avLst/>
+          </a:prstGeom>
+          <a:noFill/>
+          <a:ln>
+            <a:solidFill>
+              <a:srgbClr val="FF0000"/>
+            </a:solidFill>
+            <a:prstDash val="lgDash"/>
+          </a:ln>
+        </p:spPr>
+        <p:style>
+          <a:lnRef idx="2">
+            <a:schemeClr val="accent1">
+              <a:shade val="50000"/>
+            </a:schemeClr>
+          </a:lnRef>
+          <a:fillRef idx="1">
+            <a:schemeClr val="accent1"/>
+          </a:fillRef>
+          <a:effectRef idx="0">
+            <a:schemeClr val="accent1"/>
+          </a:effectRef>
+          <a:fontRef idx="minor">
+            <a:schemeClr val="lt1"/>
+          </a:fontRef>
+        </p:style>
+        <p:txBody>
+          <a:bodyPr rtlCol="0" anchor="ctr"/>
+          <a:lstStyle/>
+          <a:p>
+            <a:pPr algn="ctr"/>
+            <a:endParaRPr lang="en-US" sz="1372"/>
+          </a:p>
+        </p:txBody>
+      </p:sp>
+      <p:sp>
+        <p:nvSpPr>
+          <p:cNvPr id="17" name="TextBox 16">
+            <a:extLst>
+              <a:ext uri="{FF2B5EF4-FFF2-40B4-BE49-F238E27FC236}">
+                <a16:creationId xmlns:a16="http://schemas.microsoft.com/office/drawing/2014/main" id="{E3F07DA3-F689-44D5-AE9F-026A2934BCEA}"/>
+              </a:ext>
+            </a:extLst>
+          </p:cNvPr>
+          <p:cNvSpPr txBox="1"/>
+          <p:nvPr/>
+        </p:nvSpPr>
+        <p:spPr>
+          <a:xfrm>
+            <a:off x="8503600" y="3401655"/>
+            <a:ext cx="1016753" cy="303481"/>
+          </a:xfrm>
+          <a:prstGeom prst="rect">
+            <a:avLst/>
+          </a:prstGeom>
+          <a:noFill/>
+        </p:spPr>
+        <p:txBody>
+          <a:bodyPr wrap="none" rtlCol="0">
+            <a:spAutoFit/>
+          </a:bodyPr>
+          <a:lstStyle/>
+          <a:p>
+            <a:r>
+              <a:rPr lang="en-US" sz="1372" b="1" i="1" dirty="0">
+                <a:solidFill>
+                  <a:srgbClr val="FF0000"/>
+                </a:solidFill>
+              </a:rPr>
+              <a:t>&lt;All-event&gt;</a:t>
+            </a:r>
+          </a:p>
+        </p:txBody>
+      </p:sp>
+      <p:sp>
+        <p:nvSpPr>
+          <p:cNvPr id="18" name="Rounded Rectangle 19">
+            <a:extLst>
+              <a:ext uri="{FF2B5EF4-FFF2-40B4-BE49-F238E27FC236}">
+                <a16:creationId xmlns:a16="http://schemas.microsoft.com/office/drawing/2014/main" id="{6CC5444A-DD87-41DB-8D54-B15184194291}"/>
+              </a:ext>
+            </a:extLst>
+          </p:cNvPr>
+          <p:cNvSpPr/>
+          <p:nvPr/>
+        </p:nvSpPr>
+        <p:spPr>
+          <a:xfrm>
+            <a:off x="8216857" y="5579737"/>
+            <a:ext cx="1650319" cy="1166483"/>
+          </a:xfrm>
+          <a:prstGeom prst="roundRect">
+            <a:avLst/>
+          </a:prstGeom>
+          <a:noFill/>
+          <a:ln>
+            <a:solidFill>
+              <a:srgbClr val="FF0000"/>
+            </a:solidFill>
+            <a:prstDash val="lgDash"/>
+          </a:ln>
+        </p:spPr>
+        <p:style>
+          <a:lnRef idx="2">
+            <a:schemeClr val="accent1">
+              <a:shade val="50000"/>
+            </a:schemeClr>
+          </a:lnRef>
+          <a:fillRef idx="1">
+            <a:schemeClr val="accent1"/>
+          </a:fillRef>
+          <a:effectRef idx="0">
+            <a:schemeClr val="accent1"/>
+          </a:effectRef>
+          <a:fontRef idx="minor">
+            <a:schemeClr val="lt1"/>
+          </a:fontRef>
+        </p:style>
+        <p:txBody>
+          <a:bodyPr rtlCol="0" anchor="ctr"/>
+          <a:lstStyle/>
+          <a:p>
+            <a:pPr algn="ctr"/>
+            <a:endParaRPr lang="en-US" sz="1372"/>
+          </a:p>
+        </p:txBody>
+      </p:sp>
+      <p:cxnSp>
+        <p:nvCxnSpPr>
+          <p:cNvPr id="27" name="Straight Arrow Connector 26">
+            <a:extLst>
+              <a:ext uri="{FF2B5EF4-FFF2-40B4-BE49-F238E27FC236}">
+                <a16:creationId xmlns:a16="http://schemas.microsoft.com/office/drawing/2014/main" id="{6A61D7E5-574E-4E96-8B7D-43F2DE8A4024}"/>
+              </a:ext>
+            </a:extLst>
+          </p:cNvPr>
+          <p:cNvCxnSpPr>
+            <a:cxnSpLocks/>
+          </p:cNvCxnSpPr>
+          <p:nvPr/>
+        </p:nvCxnSpPr>
+        <p:spPr>
+          <a:xfrm flipH="1">
+            <a:off x="6136355" y="1458596"/>
+            <a:ext cx="2050463" cy="2272074"/>
+          </a:xfrm>
+          <a:prstGeom prst="straightConnector1">
+            <a:avLst/>
+          </a:prstGeom>
+          <a:ln>
+            <a:tailEnd type="triangle"/>
+          </a:ln>
+        </p:spPr>
+        <p:style>
+          <a:lnRef idx="1">
+            <a:schemeClr val="accent1"/>
+          </a:lnRef>
+          <a:fillRef idx="0">
+            <a:schemeClr val="accent1"/>
+          </a:fillRef>
+          <a:effectRef idx="0">
+            <a:schemeClr val="accent1"/>
+          </a:effectRef>
+          <a:fontRef idx="minor">
+            <a:schemeClr val="tx1"/>
+          </a:fontRef>
+        </p:style>
+      </p:cxnSp>
+      <p:sp>
+        <p:nvSpPr>
+          <p:cNvPr id="28" name="Rounded Rectangle 16">
+            <a:extLst>
+              <a:ext uri="{FF2B5EF4-FFF2-40B4-BE49-F238E27FC236}">
+                <a16:creationId xmlns:a16="http://schemas.microsoft.com/office/drawing/2014/main" id="{E2DC3A0E-0C6C-48A4-9272-B6DF93213E90}"/>
+              </a:ext>
+            </a:extLst>
+          </p:cNvPr>
+          <p:cNvSpPr/>
+          <p:nvPr/>
+        </p:nvSpPr>
+        <p:spPr>
+          <a:xfrm>
+            <a:off x="8135172" y="292113"/>
+            <a:ext cx="1650319" cy="1166483"/>
+          </a:xfrm>
+          <a:prstGeom prst="roundRect">
+            <a:avLst/>
+          </a:prstGeom>
+          <a:noFill/>
+          <a:ln>
+            <a:solidFill>
+              <a:srgbClr val="FF0000"/>
+            </a:solidFill>
+            <a:prstDash val="lgDash"/>
+          </a:ln>
+        </p:spPr>
+        <p:style>
+          <a:lnRef idx="2">
+            <a:schemeClr val="accent1">
+              <a:shade val="50000"/>
+            </a:schemeClr>
+          </a:lnRef>
+          <a:fillRef idx="1">
+            <a:schemeClr val="accent1"/>
+          </a:fillRef>
+          <a:effectRef idx="0">
+            <a:schemeClr val="accent1"/>
+          </a:effectRef>
+          <a:fontRef idx="minor">
+            <a:schemeClr val="lt1"/>
+          </a:fontRef>
+        </p:style>
+        <p:txBody>
+          <a:bodyPr rtlCol="0" anchor="ctr"/>
+          <a:lstStyle/>
+          <a:p>
+            <a:pPr algn="ctr"/>
+            <a:endParaRPr lang="en-US" sz="1372"/>
+          </a:p>
+        </p:txBody>
+      </p:sp>
+      <p:sp>
+        <p:nvSpPr>
+          <p:cNvPr id="29" name="TextBox 28">
+            <a:extLst>
+              <a:ext uri="{FF2B5EF4-FFF2-40B4-BE49-F238E27FC236}">
+                <a16:creationId xmlns:a16="http://schemas.microsoft.com/office/drawing/2014/main" id="{5AF9EC71-2FD4-4B45-812D-1A69991F44D9}"/>
+              </a:ext>
+            </a:extLst>
+          </p:cNvPr>
+          <p:cNvSpPr txBox="1"/>
+          <p:nvPr/>
+        </p:nvSpPr>
+        <p:spPr>
+          <a:xfrm>
+            <a:off x="8625046" y="695021"/>
+            <a:ext cx="670568" cy="303481"/>
+          </a:xfrm>
+          <a:prstGeom prst="rect">
+            <a:avLst/>
+          </a:prstGeom>
+          <a:noFill/>
+        </p:spPr>
+        <p:txBody>
+          <a:bodyPr wrap="none" rtlCol="0">
+            <a:spAutoFit/>
+          </a:bodyPr>
+          <a:lstStyle/>
+          <a:p>
+            <a:r>
+              <a:rPr lang="en-US" sz="1372" dirty="0"/>
+              <a:t>users[]</a:t>
+            </a:r>
+          </a:p>
+        </p:txBody>
+      </p:sp>
+      <p:sp>
+        <p:nvSpPr>
+          <p:cNvPr id="30" name="TextBox 29">
+            <a:extLst>
+              <a:ext uri="{FF2B5EF4-FFF2-40B4-BE49-F238E27FC236}">
+                <a16:creationId xmlns:a16="http://schemas.microsoft.com/office/drawing/2014/main" id="{D4A3B7F0-2DF5-4BFE-AD02-1303A3AD67B7}"/>
+              </a:ext>
+            </a:extLst>
+          </p:cNvPr>
+          <p:cNvSpPr txBox="1"/>
+          <p:nvPr/>
+        </p:nvSpPr>
+        <p:spPr>
+          <a:xfrm>
+            <a:off x="8244173" y="372063"/>
+            <a:ext cx="1432315" cy="303481"/>
+          </a:xfrm>
+          <a:prstGeom prst="rect">
+            <a:avLst/>
+          </a:prstGeom>
+          <a:noFill/>
+        </p:spPr>
+        <p:txBody>
+          <a:bodyPr wrap="none" rtlCol="0">
+            <a:spAutoFit/>
+          </a:bodyPr>
+          <a:lstStyle/>
+          <a:p>
+            <a:r>
+              <a:rPr lang="en-US" sz="1372" b="1" i="1" dirty="0">
+                <a:solidFill>
+                  <a:srgbClr val="FF0000"/>
+                </a:solidFill>
+              </a:rPr>
+              <a:t>&lt;sign in/sign up&gt;</a:t>
+            </a:r>
+          </a:p>
+        </p:txBody>
+      </p:sp>
+      <p:cxnSp>
+        <p:nvCxnSpPr>
+          <p:cNvPr id="34" name="Straight Arrow Connector 33">
+            <a:extLst>
+              <a:ext uri="{FF2B5EF4-FFF2-40B4-BE49-F238E27FC236}">
+                <a16:creationId xmlns:a16="http://schemas.microsoft.com/office/drawing/2014/main" id="{D550B14B-BD9F-4FEF-9467-94E67A5EC951}"/>
+              </a:ext>
+            </a:extLst>
+          </p:cNvPr>
+          <p:cNvCxnSpPr>
+            <a:cxnSpLocks/>
+          </p:cNvCxnSpPr>
+          <p:nvPr/>
+        </p:nvCxnSpPr>
+        <p:spPr>
+          <a:xfrm flipH="1" flipV="1">
+            <a:off x="6459934" y="4897153"/>
+            <a:ext cx="1608908" cy="837015"/>
+          </a:xfrm>
+          <a:prstGeom prst="straightConnector1">
+            <a:avLst/>
+          </a:prstGeom>
+          <a:ln>
+            <a:tailEnd type="triangle"/>
+          </a:ln>
+        </p:spPr>
+        <p:style>
+          <a:lnRef idx="1">
+            <a:schemeClr val="accent1"/>
+          </a:lnRef>
+          <a:fillRef idx="0">
+            <a:schemeClr val="accent1"/>
+          </a:fillRef>
+          <a:effectRef idx="0">
+            <a:schemeClr val="accent1"/>
+          </a:effectRef>
+          <a:fontRef idx="minor">
+            <a:schemeClr val="tx1"/>
+          </a:fontRef>
+        </p:style>
+      </p:cxnSp>
+      <p:cxnSp>
+        <p:nvCxnSpPr>
+          <p:cNvPr id="36" name="Straight Arrow Connector 35">
+            <a:extLst>
+              <a:ext uri="{FF2B5EF4-FFF2-40B4-BE49-F238E27FC236}">
+                <a16:creationId xmlns:a16="http://schemas.microsoft.com/office/drawing/2014/main" id="{67C25321-B8FD-416F-941A-C430E8CC21AD}"/>
+              </a:ext>
+            </a:extLst>
+          </p:cNvPr>
+          <p:cNvCxnSpPr>
+            <a:cxnSpLocks/>
+            <a:endCxn id="5" idx="2"/>
+          </p:cNvCxnSpPr>
+          <p:nvPr/>
+        </p:nvCxnSpPr>
+        <p:spPr>
+          <a:xfrm flipH="1" flipV="1">
+            <a:off x="2093812" y="1690287"/>
+            <a:ext cx="2833102" cy="2122514"/>
+          </a:xfrm>
+          <a:prstGeom prst="straightConnector1">
+            <a:avLst/>
+          </a:prstGeom>
+          <a:ln>
+            <a:tailEnd type="triangle"/>
+          </a:ln>
+        </p:spPr>
+        <p:style>
+          <a:lnRef idx="1">
+            <a:schemeClr val="accent1"/>
+          </a:lnRef>
+          <a:fillRef idx="0">
+            <a:schemeClr val="accent1"/>
+          </a:fillRef>
+          <a:effectRef idx="0">
+            <a:schemeClr val="accent1"/>
+          </a:effectRef>
+          <a:fontRef idx="minor">
+            <a:schemeClr val="tx1"/>
+          </a:fontRef>
+        </p:style>
+      </p:cxnSp>
+      <p:sp>
+        <p:nvSpPr>
+          <p:cNvPr id="43" name="TextBox 42">
+            <a:extLst>
+              <a:ext uri="{FF2B5EF4-FFF2-40B4-BE49-F238E27FC236}">
+                <a16:creationId xmlns:a16="http://schemas.microsoft.com/office/drawing/2014/main" id="{449AB93D-5B80-4DAF-A123-6C06E85D78C0}"/>
+              </a:ext>
+            </a:extLst>
+          </p:cNvPr>
+          <p:cNvSpPr txBox="1"/>
+          <p:nvPr/>
+        </p:nvSpPr>
+        <p:spPr>
+          <a:xfrm>
+            <a:off x="8299024" y="5680246"/>
+            <a:ext cx="1485984" cy="303481"/>
+          </a:xfrm>
+          <a:prstGeom prst="rect">
+            <a:avLst/>
+          </a:prstGeom>
+          <a:noFill/>
+        </p:spPr>
+        <p:txBody>
+          <a:bodyPr wrap="none" rtlCol="0">
+            <a:spAutoFit/>
+          </a:bodyPr>
+          <a:lstStyle/>
+          <a:p>
+            <a:r>
+              <a:rPr lang="en-US" sz="1372" b="1" i="1" dirty="0">
+                <a:solidFill>
+                  <a:srgbClr val="FF0000"/>
+                </a:solidFill>
+              </a:rPr>
+              <a:t>&lt;Category-event&gt;</a:t>
+            </a:r>
+          </a:p>
+        </p:txBody>
+      </p:sp>
+      <p:sp>
+        <p:nvSpPr>
+          <p:cNvPr id="44" name="TextBox 43">
+            <a:extLst>
+              <a:ext uri="{FF2B5EF4-FFF2-40B4-BE49-F238E27FC236}">
+                <a16:creationId xmlns:a16="http://schemas.microsoft.com/office/drawing/2014/main" id="{BEFB7E2D-91C1-4487-A57E-32A15CE835DA}"/>
+              </a:ext>
+            </a:extLst>
+          </p:cNvPr>
+          <p:cNvSpPr txBox="1"/>
+          <p:nvPr/>
+        </p:nvSpPr>
+        <p:spPr>
+          <a:xfrm>
+            <a:off x="8662842" y="5882089"/>
+            <a:ext cx="698268" cy="303481"/>
+          </a:xfrm>
+          <a:prstGeom prst="rect">
+            <a:avLst/>
+          </a:prstGeom>
+          <a:noFill/>
+        </p:spPr>
+        <p:txBody>
+          <a:bodyPr wrap="none" rtlCol="0">
+            <a:spAutoFit/>
+          </a:bodyPr>
+          <a:lstStyle/>
+          <a:p>
+            <a:r>
+              <a:rPr lang="en-US" sz="1372" dirty="0"/>
+              <a:t>event[]</a:t>
+            </a:r>
+          </a:p>
+        </p:txBody>
+      </p:sp>
+      <p:cxnSp>
+        <p:nvCxnSpPr>
+          <p:cNvPr id="45" name="Straight Arrow Connector 44">
+            <a:extLst>
+              <a:ext uri="{FF2B5EF4-FFF2-40B4-BE49-F238E27FC236}">
+                <a16:creationId xmlns:a16="http://schemas.microsoft.com/office/drawing/2014/main" id="{FFF4E7D7-E04A-4AD2-BD34-008BAB75B1EB}"/>
+              </a:ext>
+            </a:extLst>
+          </p:cNvPr>
+          <p:cNvCxnSpPr>
+            <a:cxnSpLocks/>
+            <a:stCxn id="8" idx="1"/>
+          </p:cNvCxnSpPr>
+          <p:nvPr/>
+        </p:nvCxnSpPr>
+        <p:spPr>
+          <a:xfrm flipH="1">
+            <a:off x="6555053" y="3983293"/>
+            <a:ext cx="1580120" cy="135893"/>
+          </a:xfrm>
+          <a:prstGeom prst="straightConnector1">
+            <a:avLst/>
+          </a:prstGeom>
+          <a:ln>
+            <a:tailEnd type="triangle"/>
+          </a:ln>
+        </p:spPr>
+        <p:style>
+          <a:lnRef idx="1">
+            <a:schemeClr val="accent1"/>
+          </a:lnRef>
+          <a:fillRef idx="0">
+            <a:schemeClr val="accent1"/>
+          </a:fillRef>
+          <a:effectRef idx="0">
+            <a:schemeClr val="accent1"/>
+          </a:effectRef>
+          <a:fontRef idx="minor">
+            <a:schemeClr val="tx1"/>
+          </a:fontRef>
+        </p:style>
+      </p:cxnSp>
+      <p:sp>
+        <p:nvSpPr>
+          <p:cNvPr id="47" name="TextBox 46">
+            <a:extLst>
+              <a:ext uri="{FF2B5EF4-FFF2-40B4-BE49-F238E27FC236}">
+                <a16:creationId xmlns:a16="http://schemas.microsoft.com/office/drawing/2014/main" id="{9FD8220A-62D5-4E83-97B6-A18797F1547A}"/>
+              </a:ext>
+            </a:extLst>
+          </p:cNvPr>
+          <p:cNvSpPr txBox="1"/>
+          <p:nvPr/>
+        </p:nvSpPr>
+        <p:spPr>
+          <a:xfrm>
+            <a:off x="1907379" y="850917"/>
+            <a:ext cx="698268" cy="303481"/>
+          </a:xfrm>
+          <a:prstGeom prst="rect">
+            <a:avLst/>
+          </a:prstGeom>
+          <a:noFill/>
+        </p:spPr>
+        <p:txBody>
+          <a:bodyPr wrap="none" rtlCol="0">
+            <a:spAutoFit/>
+          </a:bodyPr>
+          <a:lstStyle/>
+          <a:p>
+            <a:r>
+              <a:rPr lang="en-US" sz="1372" dirty="0"/>
+              <a:t>event[]</a:t>
+            </a:r>
+          </a:p>
+        </p:txBody>
+      </p:sp>
+      <p:sp>
+        <p:nvSpPr>
+          <p:cNvPr id="48" name="Rounded Rectangle 19">
+            <a:extLst>
+              <a:ext uri="{FF2B5EF4-FFF2-40B4-BE49-F238E27FC236}">
+                <a16:creationId xmlns:a16="http://schemas.microsoft.com/office/drawing/2014/main" id="{5CF67617-A289-4B21-89C3-E2A42CA478D0}"/>
+              </a:ext>
+            </a:extLst>
+          </p:cNvPr>
+          <p:cNvSpPr/>
+          <p:nvPr/>
+        </p:nvSpPr>
+        <p:spPr>
+          <a:xfrm>
+            <a:off x="1281029" y="3073888"/>
+            <a:ext cx="1650319" cy="1166483"/>
+          </a:xfrm>
+          <a:prstGeom prst="roundRect">
+            <a:avLst/>
+          </a:prstGeom>
+          <a:noFill/>
+          <a:ln>
+            <a:solidFill>
+              <a:srgbClr val="FF0000"/>
+            </a:solidFill>
+            <a:prstDash val="lgDash"/>
+          </a:ln>
+        </p:spPr>
+        <p:style>
+          <a:lnRef idx="2">
+            <a:schemeClr val="accent1">
+              <a:shade val="50000"/>
+            </a:schemeClr>
+          </a:lnRef>
+          <a:fillRef idx="1">
+            <a:schemeClr val="accent1"/>
+          </a:fillRef>
+          <a:effectRef idx="0">
+            <a:schemeClr val="accent1"/>
+          </a:effectRef>
+          <a:fontRef idx="minor">
+            <a:schemeClr val="lt1"/>
+          </a:fontRef>
+        </p:style>
+        <p:txBody>
+          <a:bodyPr rtlCol="0" anchor="ctr"/>
+          <a:lstStyle/>
+          <a:p>
+            <a:pPr algn="ctr"/>
+            <a:endParaRPr lang="en-US" sz="1372"/>
+          </a:p>
+        </p:txBody>
+      </p:sp>
+      <p:sp>
+        <p:nvSpPr>
+          <p:cNvPr id="49" name="Rounded Rectangle 19">
+            <a:extLst>
+              <a:ext uri="{FF2B5EF4-FFF2-40B4-BE49-F238E27FC236}">
+                <a16:creationId xmlns:a16="http://schemas.microsoft.com/office/drawing/2014/main" id="{C6B7C5F2-F491-42FE-8F78-2880D2CAF4B2}"/>
+              </a:ext>
+            </a:extLst>
+          </p:cNvPr>
+          <p:cNvSpPr/>
+          <p:nvPr/>
+        </p:nvSpPr>
+        <p:spPr>
+          <a:xfrm>
+            <a:off x="4591790" y="390070"/>
+            <a:ext cx="1650319" cy="1166483"/>
+          </a:xfrm>
+          <a:prstGeom prst="roundRect">
+            <a:avLst/>
+          </a:prstGeom>
+          <a:noFill/>
+          <a:ln>
+            <a:solidFill>
+              <a:srgbClr val="FF0000"/>
+            </a:solidFill>
+            <a:prstDash val="lgDash"/>
+          </a:ln>
+        </p:spPr>
+        <p:style>
+          <a:lnRef idx="2">
+            <a:schemeClr val="accent1">
+              <a:shade val="50000"/>
+            </a:schemeClr>
+          </a:lnRef>
+          <a:fillRef idx="1">
+            <a:schemeClr val="accent1"/>
+          </a:fillRef>
+          <a:effectRef idx="0">
+            <a:schemeClr val="accent1"/>
+          </a:effectRef>
+          <a:fontRef idx="minor">
+            <a:schemeClr val="lt1"/>
+          </a:fontRef>
+        </p:style>
+        <p:txBody>
+          <a:bodyPr rtlCol="0" anchor="ctr"/>
+          <a:lstStyle/>
+          <a:p>
+            <a:pPr algn="ctr"/>
+            <a:endParaRPr lang="en-US" sz="1372"/>
+          </a:p>
+        </p:txBody>
+      </p:sp>
+      <p:sp>
+        <p:nvSpPr>
+          <p:cNvPr id="50" name="Rounded Rectangle 19">
+            <a:extLst>
+              <a:ext uri="{FF2B5EF4-FFF2-40B4-BE49-F238E27FC236}">
+                <a16:creationId xmlns:a16="http://schemas.microsoft.com/office/drawing/2014/main" id="{4E224C4E-AC86-4698-95AF-580204C1F5FD}"/>
+              </a:ext>
+            </a:extLst>
+          </p:cNvPr>
+          <p:cNvSpPr/>
+          <p:nvPr/>
+        </p:nvSpPr>
+        <p:spPr>
+          <a:xfrm>
+            <a:off x="1431353" y="5579736"/>
+            <a:ext cx="1650319" cy="1166483"/>
+          </a:xfrm>
+          <a:prstGeom prst="roundRect">
+            <a:avLst/>
+          </a:prstGeom>
+          <a:noFill/>
+          <a:ln>
+            <a:solidFill>
+              <a:srgbClr val="FF0000"/>
+            </a:solidFill>
+            <a:prstDash val="lgDash"/>
+          </a:ln>
+        </p:spPr>
+        <p:style>
+          <a:lnRef idx="2">
+            <a:schemeClr val="accent1">
+              <a:shade val="50000"/>
+            </a:schemeClr>
+          </a:lnRef>
+          <a:fillRef idx="1">
+            <a:schemeClr val="accent1"/>
+          </a:fillRef>
+          <a:effectRef idx="0">
+            <a:schemeClr val="accent1"/>
+          </a:effectRef>
+          <a:fontRef idx="minor">
+            <a:schemeClr val="lt1"/>
+          </a:fontRef>
+        </p:style>
+        <p:txBody>
+          <a:bodyPr rtlCol="0" anchor="ctr"/>
+          <a:lstStyle/>
+          <a:p>
+            <a:pPr algn="ctr"/>
+            <a:endParaRPr lang="en-US" sz="1372"/>
+          </a:p>
+        </p:txBody>
+      </p:sp>
+      <p:sp>
+        <p:nvSpPr>
+          <p:cNvPr id="51" name="TextBox 50">
+            <a:extLst>
+              <a:ext uri="{FF2B5EF4-FFF2-40B4-BE49-F238E27FC236}">
+                <a16:creationId xmlns:a16="http://schemas.microsoft.com/office/drawing/2014/main" id="{A30A5703-AE9F-4FFE-902E-0AEA34B856BB}"/>
+              </a:ext>
+            </a:extLst>
+          </p:cNvPr>
+          <p:cNvSpPr txBox="1"/>
+          <p:nvPr/>
+        </p:nvSpPr>
+        <p:spPr>
+          <a:xfrm>
+            <a:off x="1783397" y="3104271"/>
+            <a:ext cx="763351" cy="303481"/>
+          </a:xfrm>
+          <a:prstGeom prst="rect">
+            <a:avLst/>
+          </a:prstGeom>
+          <a:noFill/>
+        </p:spPr>
+        <p:txBody>
+          <a:bodyPr wrap="none" rtlCol="0">
+            <a:spAutoFit/>
+          </a:bodyPr>
+          <a:lstStyle/>
+          <a:p>
+            <a:r>
+              <a:rPr lang="en-US" sz="1372" b="1" i="1" dirty="0">
+                <a:solidFill>
+                  <a:srgbClr val="FF0000"/>
+                </a:solidFill>
+              </a:rPr>
+              <a:t>&lt;Users&gt;</a:t>
+            </a:r>
+          </a:p>
+        </p:txBody>
+      </p:sp>
+      <p:sp>
+        <p:nvSpPr>
+          <p:cNvPr id="52" name="TextBox 51">
+            <a:extLst>
+              <a:ext uri="{FF2B5EF4-FFF2-40B4-BE49-F238E27FC236}">
+                <a16:creationId xmlns:a16="http://schemas.microsoft.com/office/drawing/2014/main" id="{C02F2270-D9A2-418C-A39F-D7370575088F}"/>
+              </a:ext>
+            </a:extLst>
+          </p:cNvPr>
+          <p:cNvSpPr txBox="1"/>
+          <p:nvPr/>
+        </p:nvSpPr>
+        <p:spPr>
+          <a:xfrm>
+            <a:off x="4922978" y="415031"/>
+            <a:ext cx="1053494" cy="303481"/>
+          </a:xfrm>
+          <a:prstGeom prst="rect">
+            <a:avLst/>
+          </a:prstGeom>
+          <a:noFill/>
+        </p:spPr>
+        <p:txBody>
+          <a:bodyPr wrap="none" rtlCol="0">
+            <a:spAutoFit/>
+          </a:bodyPr>
+          <a:lstStyle/>
+          <a:p>
+            <a:r>
+              <a:rPr lang="en-US" sz="1372" b="1" i="1" dirty="0">
+                <a:solidFill>
+                  <a:srgbClr val="FF0000"/>
+                </a:solidFill>
+              </a:rPr>
+              <a:t>&lt;Members&gt;</a:t>
+            </a:r>
+          </a:p>
+        </p:txBody>
+      </p:sp>
+      <p:sp>
+        <p:nvSpPr>
+          <p:cNvPr id="53" name="TextBox 52">
+            <a:extLst>
+              <a:ext uri="{FF2B5EF4-FFF2-40B4-BE49-F238E27FC236}">
+                <a16:creationId xmlns:a16="http://schemas.microsoft.com/office/drawing/2014/main" id="{DE4B26AC-1246-4302-8C27-359869308A75}"/>
+              </a:ext>
+            </a:extLst>
+          </p:cNvPr>
+          <p:cNvSpPr txBox="1"/>
+          <p:nvPr/>
+        </p:nvSpPr>
+        <p:spPr>
+          <a:xfrm>
+            <a:off x="1875021" y="5582427"/>
+            <a:ext cx="899605" cy="303481"/>
+          </a:xfrm>
+          <a:prstGeom prst="rect">
+            <a:avLst/>
+          </a:prstGeom>
+          <a:noFill/>
+        </p:spPr>
+        <p:txBody>
+          <a:bodyPr wrap="none" rtlCol="0">
+            <a:spAutoFit/>
+          </a:bodyPr>
+          <a:lstStyle/>
+          <a:p>
+            <a:r>
+              <a:rPr lang="en-US" sz="1372" b="1" i="1" dirty="0">
+                <a:solidFill>
+                  <a:srgbClr val="FF0000"/>
+                </a:solidFill>
+              </a:rPr>
+              <a:t>&lt;Actions&gt;</a:t>
+            </a:r>
+          </a:p>
+        </p:txBody>
+      </p:sp>
+      <p:sp>
+        <p:nvSpPr>
+          <p:cNvPr id="54" name="TextBox 53">
+            <a:extLst>
+              <a:ext uri="{FF2B5EF4-FFF2-40B4-BE49-F238E27FC236}">
+                <a16:creationId xmlns:a16="http://schemas.microsoft.com/office/drawing/2014/main" id="{81762D77-26DB-41B9-9DBF-240E2E667625}"/>
+              </a:ext>
+            </a:extLst>
+          </p:cNvPr>
+          <p:cNvSpPr txBox="1"/>
+          <p:nvPr/>
+        </p:nvSpPr>
+        <p:spPr>
+          <a:xfrm>
+            <a:off x="1920750" y="5882088"/>
+            <a:ext cx="698268" cy="303481"/>
+          </a:xfrm>
+          <a:prstGeom prst="rect">
+            <a:avLst/>
+          </a:prstGeom>
+          <a:noFill/>
+        </p:spPr>
+        <p:txBody>
+          <a:bodyPr wrap="none" rtlCol="0">
+            <a:spAutoFit/>
+          </a:bodyPr>
+          <a:lstStyle/>
+          <a:p>
+            <a:r>
+              <a:rPr lang="en-US" sz="1372" dirty="0"/>
+              <a:t>event[]</a:t>
+            </a:r>
+          </a:p>
+        </p:txBody>
+      </p:sp>
+      <p:sp>
+        <p:nvSpPr>
+          <p:cNvPr id="55" name="TextBox 54">
+            <a:extLst>
+              <a:ext uri="{FF2B5EF4-FFF2-40B4-BE49-F238E27FC236}">
+                <a16:creationId xmlns:a16="http://schemas.microsoft.com/office/drawing/2014/main" id="{CCAA0C64-4DD8-4B59-93CD-3776A57D6C2A}"/>
+              </a:ext>
+            </a:extLst>
+          </p:cNvPr>
+          <p:cNvSpPr txBox="1"/>
+          <p:nvPr/>
+        </p:nvSpPr>
+        <p:spPr>
+          <a:xfrm>
+            <a:off x="1802776" y="3291549"/>
+            <a:ext cx="698268" cy="303481"/>
+          </a:xfrm>
+          <a:prstGeom prst="rect">
+            <a:avLst/>
+          </a:prstGeom>
+          <a:noFill/>
+        </p:spPr>
+        <p:txBody>
+          <a:bodyPr wrap="none" rtlCol="0">
+            <a:spAutoFit/>
+          </a:bodyPr>
+          <a:lstStyle/>
+          <a:p>
+            <a:r>
+              <a:rPr lang="en-US" sz="1372" dirty="0"/>
+              <a:t>event[]</a:t>
+            </a:r>
+          </a:p>
+        </p:txBody>
+      </p:sp>
+      <p:sp>
+        <p:nvSpPr>
+          <p:cNvPr id="56" name="TextBox 55">
+            <a:extLst>
+              <a:ext uri="{FF2B5EF4-FFF2-40B4-BE49-F238E27FC236}">
+                <a16:creationId xmlns:a16="http://schemas.microsoft.com/office/drawing/2014/main" id="{9A0EE01C-D993-48E1-A1D1-07D4007175DA}"/>
+              </a:ext>
+            </a:extLst>
+          </p:cNvPr>
+          <p:cNvSpPr txBox="1"/>
+          <p:nvPr/>
+        </p:nvSpPr>
+        <p:spPr>
+          <a:xfrm>
+            <a:off x="5090138" y="743120"/>
+            <a:ext cx="698268" cy="303481"/>
+          </a:xfrm>
+          <a:prstGeom prst="rect">
+            <a:avLst/>
+          </a:prstGeom>
+          <a:noFill/>
+        </p:spPr>
+        <p:txBody>
+          <a:bodyPr wrap="none" rtlCol="0">
+            <a:spAutoFit/>
+          </a:bodyPr>
+          <a:lstStyle/>
+          <a:p>
+            <a:r>
+              <a:rPr lang="en-US" sz="1372" dirty="0"/>
+              <a:t>event[]</a:t>
+            </a:r>
+          </a:p>
+        </p:txBody>
+      </p:sp>
+      <p:cxnSp>
+        <p:nvCxnSpPr>
+          <p:cNvPr id="57" name="Straight Arrow Connector 56">
+            <a:extLst>
+              <a:ext uri="{FF2B5EF4-FFF2-40B4-BE49-F238E27FC236}">
+                <a16:creationId xmlns:a16="http://schemas.microsoft.com/office/drawing/2014/main" id="{0D9BFEF0-AFDB-4846-9D1B-B9B36DA2540C}"/>
+              </a:ext>
+            </a:extLst>
+          </p:cNvPr>
+          <p:cNvCxnSpPr>
+            <a:cxnSpLocks/>
+            <a:stCxn id="50" idx="3"/>
+          </p:cNvCxnSpPr>
+          <p:nvPr/>
+        </p:nvCxnSpPr>
+        <p:spPr>
+          <a:xfrm flipV="1">
+            <a:off x="3081672" y="4897154"/>
+            <a:ext cx="1841306" cy="1265824"/>
+          </a:xfrm>
+          <a:prstGeom prst="straightConnector1">
+            <a:avLst/>
+          </a:prstGeom>
+          <a:ln>
+            <a:tailEnd type="triangle"/>
+          </a:ln>
+        </p:spPr>
+        <p:style>
+          <a:lnRef idx="1">
+            <a:schemeClr val="accent1"/>
+          </a:lnRef>
+          <a:fillRef idx="0">
+            <a:schemeClr val="accent1"/>
+          </a:fillRef>
+          <a:effectRef idx="0">
+            <a:schemeClr val="accent1"/>
+          </a:effectRef>
+          <a:fontRef idx="minor">
+            <a:schemeClr val="tx1"/>
+          </a:fontRef>
+        </p:style>
+      </p:cxnSp>
+      <p:cxnSp>
+        <p:nvCxnSpPr>
+          <p:cNvPr id="58" name="Straight Arrow Connector 57">
+            <a:extLst>
+              <a:ext uri="{FF2B5EF4-FFF2-40B4-BE49-F238E27FC236}">
+                <a16:creationId xmlns:a16="http://schemas.microsoft.com/office/drawing/2014/main" id="{3F22593D-50DF-42B8-A315-19C932F28B34}"/>
+              </a:ext>
+            </a:extLst>
+          </p:cNvPr>
+          <p:cNvCxnSpPr>
+            <a:cxnSpLocks/>
+            <a:stCxn id="48" idx="3"/>
+            <a:endCxn id="12" idx="1"/>
+          </p:cNvCxnSpPr>
+          <p:nvPr/>
+        </p:nvCxnSpPr>
+        <p:spPr>
+          <a:xfrm>
+            <a:off x="2931348" y="3657130"/>
+            <a:ext cx="1958239" cy="711262"/>
+          </a:xfrm>
+          <a:prstGeom prst="straightConnector1">
+            <a:avLst/>
+          </a:prstGeom>
+          <a:ln>
+            <a:tailEnd type="triangle"/>
+          </a:ln>
+        </p:spPr>
+        <p:style>
+          <a:lnRef idx="1">
+            <a:schemeClr val="accent1"/>
+          </a:lnRef>
+          <a:fillRef idx="0">
+            <a:schemeClr val="accent1"/>
+          </a:fillRef>
+          <a:effectRef idx="0">
+            <a:schemeClr val="accent1"/>
+          </a:effectRef>
+          <a:fontRef idx="minor">
+            <a:schemeClr val="tx1"/>
+          </a:fontRef>
+        </p:style>
+      </p:cxnSp>
+      <p:cxnSp>
+        <p:nvCxnSpPr>
+          <p:cNvPr id="66" name="Straight Arrow Connector 65">
+            <a:extLst>
+              <a:ext uri="{FF2B5EF4-FFF2-40B4-BE49-F238E27FC236}">
+                <a16:creationId xmlns:a16="http://schemas.microsoft.com/office/drawing/2014/main" id="{D80697C9-03B3-4B0A-8FA6-67B1AECC7530}"/>
+              </a:ext>
+            </a:extLst>
+          </p:cNvPr>
+          <p:cNvCxnSpPr>
+            <a:cxnSpLocks/>
+            <a:endCxn id="12" idx="0"/>
+          </p:cNvCxnSpPr>
+          <p:nvPr/>
+        </p:nvCxnSpPr>
+        <p:spPr>
+          <a:xfrm>
+            <a:off x="5304819" y="1556553"/>
+            <a:ext cx="409928" cy="2228597"/>
+          </a:xfrm>
+          <a:prstGeom prst="straightConnector1">
+            <a:avLst/>
+          </a:prstGeom>
+          <a:ln>
+            <a:tailEnd type="triangle"/>
+          </a:ln>
+        </p:spPr>
+        <p:style>
+          <a:lnRef idx="1">
+            <a:schemeClr val="accent1"/>
+          </a:lnRef>
+          <a:fillRef idx="0">
+            <a:schemeClr val="accent1"/>
+          </a:fillRef>
+          <a:effectRef idx="0">
+            <a:schemeClr val="accent1"/>
+          </a:effectRef>
+          <a:fontRef idx="minor">
+            <a:schemeClr val="tx1"/>
+          </a:fontRef>
+        </p:style>
+      </p:cxnSp>
+    </p:spTree>
+    <p:extLst>
+      <p:ext uri="{BB962C8B-B14F-4D97-AF65-F5344CB8AC3E}">
+        <p14:creationId xmlns:p14="http://schemas.microsoft.com/office/powerpoint/2010/main" val="3441796268"/>
       </p:ext>
     </p:extLst>
   </p:cSld>

</xml_diff>

<commit_message>
#28 user join event
</commit_message>
<xml_diff>
--- a/docs/COMPONENT-DIAGRAM.pptx
+++ b/docs/COMPONENT-DIAGRAM.pptx
@@ -243,7 +243,7 @@
           <a:p>
             <a:fld id="{28BE630F-C39C-4DB9-8258-0B48CA067079}" type="datetimeFigureOut">
               <a:rPr lang="en-US" smtClean="0"/>
-              <a:t>11/30/2021</a:t>
+              <a:t>12/13/2021</a:t>
             </a:fld>
             <a:endParaRPr lang="en-US"/>
           </a:p>
@@ -411,7 +411,7 @@
           <a:p>
             <a:fld id="{28BE630F-C39C-4DB9-8258-0B48CA067079}" type="datetimeFigureOut">
               <a:rPr lang="en-US" smtClean="0"/>
-              <a:t>11/30/2021</a:t>
+              <a:t>12/13/2021</a:t>
             </a:fld>
             <a:endParaRPr lang="en-US"/>
           </a:p>
@@ -589,7 +589,7 @@
           <a:p>
             <a:fld id="{28BE630F-C39C-4DB9-8258-0B48CA067079}" type="datetimeFigureOut">
               <a:rPr lang="en-US" smtClean="0"/>
-              <a:t>11/30/2021</a:t>
+              <a:t>12/13/2021</a:t>
             </a:fld>
             <a:endParaRPr lang="en-US"/>
           </a:p>
@@ -757,7 +757,7 @@
           <a:p>
             <a:fld id="{28BE630F-C39C-4DB9-8258-0B48CA067079}" type="datetimeFigureOut">
               <a:rPr lang="en-US" smtClean="0"/>
-              <a:t>11/30/2021</a:t>
+              <a:t>12/13/2021</a:t>
             </a:fld>
             <a:endParaRPr lang="en-US"/>
           </a:p>
@@ -1002,7 +1002,7 @@
           <a:p>
             <a:fld id="{28BE630F-C39C-4DB9-8258-0B48CA067079}" type="datetimeFigureOut">
               <a:rPr lang="en-US" smtClean="0"/>
-              <a:t>11/30/2021</a:t>
+              <a:t>12/13/2021</a:t>
             </a:fld>
             <a:endParaRPr lang="en-US"/>
           </a:p>
@@ -1231,7 +1231,7 @@
           <a:p>
             <a:fld id="{28BE630F-C39C-4DB9-8258-0B48CA067079}" type="datetimeFigureOut">
               <a:rPr lang="en-US" smtClean="0"/>
-              <a:t>11/30/2021</a:t>
+              <a:t>12/13/2021</a:t>
             </a:fld>
             <a:endParaRPr lang="en-US"/>
           </a:p>
@@ -1595,7 +1595,7 @@
           <a:p>
             <a:fld id="{28BE630F-C39C-4DB9-8258-0B48CA067079}" type="datetimeFigureOut">
               <a:rPr lang="en-US" smtClean="0"/>
-              <a:t>11/30/2021</a:t>
+              <a:t>12/13/2021</a:t>
             </a:fld>
             <a:endParaRPr lang="en-US"/>
           </a:p>
@@ -1712,7 +1712,7 @@
           <a:p>
             <a:fld id="{28BE630F-C39C-4DB9-8258-0B48CA067079}" type="datetimeFigureOut">
               <a:rPr lang="en-US" smtClean="0"/>
-              <a:t>11/30/2021</a:t>
+              <a:t>12/13/2021</a:t>
             </a:fld>
             <a:endParaRPr lang="en-US"/>
           </a:p>
@@ -1807,7 +1807,7 @@
           <a:p>
             <a:fld id="{28BE630F-C39C-4DB9-8258-0B48CA067079}" type="datetimeFigureOut">
               <a:rPr lang="en-US" smtClean="0"/>
-              <a:t>11/30/2021</a:t>
+              <a:t>12/13/2021</a:t>
             </a:fld>
             <a:endParaRPr lang="en-US"/>
           </a:p>
@@ -2082,7 +2082,7 @@
           <a:p>
             <a:fld id="{28BE630F-C39C-4DB9-8258-0B48CA067079}" type="datetimeFigureOut">
               <a:rPr lang="en-US" smtClean="0"/>
-              <a:t>11/30/2021</a:t>
+              <a:t>12/13/2021</a:t>
             </a:fld>
             <a:endParaRPr lang="en-US"/>
           </a:p>
@@ -2334,7 +2334,7 @@
           <a:p>
             <a:fld id="{28BE630F-C39C-4DB9-8258-0B48CA067079}" type="datetimeFigureOut">
               <a:rPr lang="en-US" smtClean="0"/>
-              <a:t>11/30/2021</a:t>
+              <a:t>12/13/2021</a:t>
             </a:fld>
             <a:endParaRPr lang="en-US"/>
           </a:p>
@@ -2545,7 +2545,7 @@
           <a:p>
             <a:fld id="{28BE630F-C39C-4DB9-8258-0B48CA067079}" type="datetimeFigureOut">
               <a:rPr lang="en-US" smtClean="0"/>
-              <a:t>11/30/2021</a:t>
+              <a:t>12/13/2021</a:t>
             </a:fld>
             <a:endParaRPr lang="en-US"/>
           </a:p>
@@ -4962,49 +4962,10 @@
       </p:grpSpPr>
       <p:sp>
         <p:nvSpPr>
-          <p:cNvPr id="4" name="TextBox 3">
+          <p:cNvPr id="49" name="Rounded Rectangle 19">
             <a:extLst>
               <a:ext uri="{FF2B5EF4-FFF2-40B4-BE49-F238E27FC236}">
-                <a16:creationId xmlns:a16="http://schemas.microsoft.com/office/drawing/2014/main" id="{2CCF02E6-F26D-497B-B3EA-592A73CD0BBA}"/>
-              </a:ext>
-            </a:extLst>
-          </p:cNvPr>
-          <p:cNvSpPr txBox="1"/>
-          <p:nvPr/>
-        </p:nvSpPr>
-        <p:spPr>
-          <a:xfrm>
-            <a:off x="5394787" y="3785150"/>
-            <a:ext cx="639919" cy="303481"/>
-          </a:xfrm>
-          <a:prstGeom prst="rect">
-            <a:avLst/>
-          </a:prstGeom>
-          <a:noFill/>
-        </p:spPr>
-        <p:txBody>
-          <a:bodyPr wrap="none" rtlCol="0">
-            <a:spAutoFit/>
-          </a:bodyPr>
-          <a:lstStyle/>
-          <a:p>
-            <a:r>
-              <a:rPr lang="en-US" sz="1372" b="1" i="1" dirty="0">
-                <a:solidFill>
-                  <a:srgbClr val="FF0000"/>
-                </a:solidFill>
-              </a:rPr>
-              <a:t>&lt;app&gt;</a:t>
-            </a:r>
-          </a:p>
-        </p:txBody>
-      </p:sp>
-      <p:sp>
-        <p:nvSpPr>
-          <p:cNvPr id="5" name="Rounded Rectangle 4">
-            <a:extLst>
-              <a:ext uri="{FF2B5EF4-FFF2-40B4-BE49-F238E27FC236}">
-                <a16:creationId xmlns:a16="http://schemas.microsoft.com/office/drawing/2014/main" id="{2F47F51C-3625-4839-9158-55851A7FCD55}"/>
+                <a16:creationId xmlns:a16="http://schemas.microsoft.com/office/drawing/2014/main" id="{C6B7C5F2-F491-42FE-8F78-2880D2CAF4B2}"/>
               </a:ext>
             </a:extLst>
           </p:cNvPr>
@@ -5013,8 +4974,8 @@
         </p:nvSpPr>
         <p:spPr>
           <a:xfrm>
-            <a:off x="1268652" y="523804"/>
-            <a:ext cx="1650319" cy="1166483"/>
+            <a:off x="638356" y="672460"/>
+            <a:ext cx="1351810" cy="806718"/>
           </a:xfrm>
           <a:prstGeom prst="roundRect">
             <a:avLst/>
@@ -5054,10 +5015,10 @@
       </p:sp>
       <p:sp>
         <p:nvSpPr>
-          <p:cNvPr id="6" name="TextBox 5">
+          <p:cNvPr id="52" name="TextBox 51">
             <a:extLst>
               <a:ext uri="{FF2B5EF4-FFF2-40B4-BE49-F238E27FC236}">
-                <a16:creationId xmlns:a16="http://schemas.microsoft.com/office/drawing/2014/main" id="{3BC86C56-B9C7-4132-A68B-A49555ABFBA5}"/>
+                <a16:creationId xmlns:a16="http://schemas.microsoft.com/office/drawing/2014/main" id="{C02F2270-D9A2-418C-A39F-D7370575088F}"/>
               </a:ext>
             </a:extLst>
           </p:cNvPr>
@@ -5066,43 +5027,8 @@
         </p:nvSpPr>
         <p:spPr>
           <a:xfrm>
-            <a:off x="5394787" y="4088631"/>
-            <a:ext cx="767198" cy="303481"/>
-          </a:xfrm>
-          <a:prstGeom prst="rect">
-            <a:avLst/>
-          </a:prstGeom>
-          <a:noFill/>
-        </p:spPr>
-        <p:txBody>
-          <a:bodyPr wrap="none" rtlCol="0">
-            <a:spAutoFit/>
-          </a:bodyPr>
-          <a:lstStyle/>
-          <a:p>
-            <a:r>
-              <a:rPr lang="en-US" sz="1372" dirty="0"/>
-              <a:t>events[]</a:t>
-            </a:r>
-          </a:p>
-        </p:txBody>
-      </p:sp>
-      <p:sp>
-        <p:nvSpPr>
-          <p:cNvPr id="7" name="TextBox 6">
-            <a:extLst>
-              <a:ext uri="{FF2B5EF4-FFF2-40B4-BE49-F238E27FC236}">
-                <a16:creationId xmlns:a16="http://schemas.microsoft.com/office/drawing/2014/main" id="{9479004F-F0FE-4B40-A93C-DBCCB3C65171}"/>
-              </a:ext>
-            </a:extLst>
-          </p:cNvPr>
-          <p:cNvSpPr txBox="1"/>
-          <p:nvPr/>
-        </p:nvSpPr>
-        <p:spPr>
-          <a:xfrm>
-            <a:off x="1773851" y="566772"/>
-            <a:ext cx="1060034" cy="303481"/>
+            <a:off x="987088" y="924078"/>
+            <a:ext cx="654346" cy="303481"/>
           </a:xfrm>
           <a:prstGeom prst="rect">
             <a:avLst/>
@@ -5121,17 +5047,17 @@
                   <a:srgbClr val="FF0000"/>
                 </a:solidFill>
               </a:rPr>
-              <a:t>&lt;My-event&gt;</a:t>
-            </a:r>
-          </a:p>
-        </p:txBody>
-      </p:sp>
-      <p:sp>
-        <p:nvSpPr>
-          <p:cNvPr id="8" name="Rounded Rectangle 8">
+              <a:t>&lt;App&gt;</a:t>
+            </a:r>
+          </a:p>
+        </p:txBody>
+      </p:sp>
+      <p:sp>
+        <p:nvSpPr>
+          <p:cNvPr id="2" name="Arrow: Right 1">
             <a:extLst>
               <a:ext uri="{FF2B5EF4-FFF2-40B4-BE49-F238E27FC236}">
-                <a16:creationId xmlns:a16="http://schemas.microsoft.com/office/drawing/2014/main" id="{7611D870-3DD9-4927-9E0D-33510A14B1F3}"/>
+                <a16:creationId xmlns:a16="http://schemas.microsoft.com/office/drawing/2014/main" id="{F1E6FC88-30B2-4366-91ED-FB7C9B92836A}"/>
               </a:ext>
             </a:extLst>
           </p:cNvPr>
@@ -5140,19 +5066,12 @@
         </p:nvSpPr>
         <p:spPr>
           <a:xfrm>
-            <a:off x="8135173" y="3400051"/>
-            <a:ext cx="1650319" cy="1166483"/>
-          </a:xfrm>
-          <a:prstGeom prst="roundRect">
-            <a:avLst/>
-          </a:prstGeom>
-          <a:noFill/>
-          <a:ln>
-            <a:solidFill>
-              <a:srgbClr val="FF0000"/>
-            </a:solidFill>
-            <a:prstDash val="lgDash"/>
-          </a:ln>
+            <a:off x="1993500" y="932380"/>
+            <a:ext cx="1465728" cy="303481"/>
+          </a:xfrm>
+          <a:prstGeom prst="rightArrow">
+            <a:avLst/>
+          </a:prstGeom>
         </p:spPr>
         <p:style>
           <a:lnRef idx="2">
@@ -5175,51 +5094,16 @@
           <a:lstStyle/>
           <a:p>
             <a:pPr algn="ctr"/>
-            <a:endParaRPr lang="en-US" sz="1372"/>
-          </a:p>
-        </p:txBody>
-      </p:sp>
-      <p:sp>
-        <p:nvSpPr>
-          <p:cNvPr id="9" name="TextBox 8">
+            <a:endParaRPr lang="en-US"/>
+          </a:p>
+        </p:txBody>
+      </p:sp>
+      <p:sp>
+        <p:nvSpPr>
+          <p:cNvPr id="35" name="Rounded Rectangle 19">
             <a:extLst>
               <a:ext uri="{FF2B5EF4-FFF2-40B4-BE49-F238E27FC236}">
-                <a16:creationId xmlns:a16="http://schemas.microsoft.com/office/drawing/2014/main" id="{A9F342E3-39AD-4265-959B-978F3C7FD8C1}"/>
-              </a:ext>
-            </a:extLst>
-          </p:cNvPr>
-          <p:cNvSpPr txBox="1"/>
-          <p:nvPr/>
-        </p:nvSpPr>
-        <p:spPr>
-          <a:xfrm>
-            <a:off x="8662842" y="3637712"/>
-            <a:ext cx="698268" cy="303481"/>
-          </a:xfrm>
-          <a:prstGeom prst="rect">
-            <a:avLst/>
-          </a:prstGeom>
-          <a:noFill/>
-        </p:spPr>
-        <p:txBody>
-          <a:bodyPr wrap="none" rtlCol="0">
-            <a:spAutoFit/>
-          </a:bodyPr>
-          <a:lstStyle/>
-          <a:p>
-            <a:r>
-              <a:rPr lang="en-US" sz="1372" dirty="0"/>
-              <a:t>event[]</a:t>
-            </a:r>
-          </a:p>
-        </p:txBody>
-      </p:sp>
-      <p:sp>
-        <p:nvSpPr>
-          <p:cNvPr id="12" name="Rounded Rectangle 12">
-            <a:extLst>
-              <a:ext uri="{FF2B5EF4-FFF2-40B4-BE49-F238E27FC236}">
-                <a16:creationId xmlns:a16="http://schemas.microsoft.com/office/drawing/2014/main" id="{7A481E5D-7A73-444C-8A56-C7083EBF7502}"/>
+                <a16:creationId xmlns:a16="http://schemas.microsoft.com/office/drawing/2014/main" id="{012366E4-2F2D-4C60-A85D-0E34B71AA12B}"/>
               </a:ext>
             </a:extLst>
           </p:cNvPr>
@@ -5228,8 +5112,8 @@
         </p:nvSpPr>
         <p:spPr>
           <a:xfrm>
-            <a:off x="4889587" y="3785150"/>
-            <a:ext cx="1650319" cy="1166483"/>
+            <a:off x="3283414" y="0"/>
+            <a:ext cx="1351810" cy="668688"/>
           </a:xfrm>
           <a:prstGeom prst="roundRect">
             <a:avLst/>
@@ -5269,10 +5153,10 @@
       </p:sp>
       <p:sp>
         <p:nvSpPr>
-          <p:cNvPr id="17" name="TextBox 16">
+          <p:cNvPr id="37" name="TextBox 36">
             <a:extLst>
               <a:ext uri="{FF2B5EF4-FFF2-40B4-BE49-F238E27FC236}">
-                <a16:creationId xmlns:a16="http://schemas.microsoft.com/office/drawing/2014/main" id="{E3F07DA3-F689-44D5-AE9F-026A2934BCEA}"/>
+                <a16:creationId xmlns:a16="http://schemas.microsoft.com/office/drawing/2014/main" id="{7F680D64-09AA-4B4B-9AEF-CA2114ABDD28}"/>
               </a:ext>
             </a:extLst>
           </p:cNvPr>
@@ -5281,8 +5165,8 @@
         </p:nvSpPr>
         <p:spPr>
           <a:xfrm>
-            <a:off x="8503600" y="3401655"/>
-            <a:ext cx="1016753" cy="303481"/>
+            <a:off x="3397530" y="113588"/>
+            <a:ext cx="1123577" cy="303481"/>
           </a:xfrm>
           <a:prstGeom prst="rect">
             <a:avLst/>
@@ -5301,17 +5185,17 @@
                   <a:srgbClr val="FF0000"/>
                 </a:solidFill>
               </a:rPr>
-              <a:t>&lt;All-event&gt;</a:t>
-            </a:r>
-          </a:p>
-        </p:txBody>
-      </p:sp>
-      <p:sp>
-        <p:nvSpPr>
-          <p:cNvPr id="18" name="Rounded Rectangle 19">
+              <a:t>&lt;Start page&gt;</a:t>
+            </a:r>
+          </a:p>
+        </p:txBody>
+      </p:sp>
+      <p:sp>
+        <p:nvSpPr>
+          <p:cNvPr id="38" name="Rounded Rectangle 19">
             <a:extLst>
               <a:ext uri="{FF2B5EF4-FFF2-40B4-BE49-F238E27FC236}">
-                <a16:creationId xmlns:a16="http://schemas.microsoft.com/office/drawing/2014/main" id="{6CC5444A-DD87-41DB-8D54-B15184194291}"/>
+                <a16:creationId xmlns:a16="http://schemas.microsoft.com/office/drawing/2014/main" id="{9E6DEEC1-D093-49FD-919D-1761A0FA95FC}"/>
               </a:ext>
             </a:extLst>
           </p:cNvPr>
@@ -5320,8 +5204,8 @@
         </p:nvSpPr>
         <p:spPr>
           <a:xfrm>
-            <a:off x="8216857" y="5579737"/>
-            <a:ext cx="1650319" cy="1166483"/>
+            <a:off x="3496115" y="809116"/>
+            <a:ext cx="938268" cy="668688"/>
           </a:xfrm>
           <a:prstGeom prst="roundRect">
             <a:avLst/>
@@ -5359,53 +5243,67 @@
           </a:p>
         </p:txBody>
       </p:sp>
-      <p:cxnSp>
-        <p:nvCxnSpPr>
-          <p:cNvPr id="27" name="Straight Arrow Connector 26">
+      <p:sp>
+        <p:nvSpPr>
+          <p:cNvPr id="39" name="TextBox 38">
             <a:extLst>
               <a:ext uri="{FF2B5EF4-FFF2-40B4-BE49-F238E27FC236}">
-                <a16:creationId xmlns:a16="http://schemas.microsoft.com/office/drawing/2014/main" id="{6A61D7E5-574E-4E96-8B7D-43F2DE8A4024}"/>
+                <a16:creationId xmlns:a16="http://schemas.microsoft.com/office/drawing/2014/main" id="{0DC40146-593F-402C-A54D-38BB0C5F5B77}"/>
               </a:ext>
             </a:extLst>
           </p:cNvPr>
-          <p:cNvCxnSpPr>
-            <a:cxnSpLocks/>
-          </p:cNvCxnSpPr>
-          <p:nvPr/>
-        </p:nvCxnSpPr>
-        <p:spPr>
-          <a:xfrm flipH="1">
-            <a:off x="6136355" y="1458596"/>
-            <a:ext cx="2050463" cy="2272074"/>
-          </a:xfrm>
-          <a:prstGeom prst="straightConnector1">
-            <a:avLst/>
-          </a:prstGeom>
-          <a:ln>
-            <a:tailEnd type="triangle"/>
-          </a:ln>
-        </p:spPr>
-        <p:style>
-          <a:lnRef idx="1">
-            <a:schemeClr val="accent1"/>
-          </a:lnRef>
-          <a:fillRef idx="0">
-            <a:schemeClr val="accent1"/>
-          </a:fillRef>
-          <a:effectRef idx="0">
-            <a:schemeClr val="accent1"/>
-          </a:effectRef>
-          <a:fontRef idx="minor">
-            <a:schemeClr val="tx1"/>
-          </a:fontRef>
-        </p:style>
-      </p:cxnSp>
-      <p:sp>
-        <p:nvSpPr>
-          <p:cNvPr id="28" name="Rounded Rectangle 16">
+          <p:cNvSpPr txBox="1"/>
+          <p:nvPr/>
+        </p:nvSpPr>
+        <p:spPr>
+          <a:xfrm>
+            <a:off x="3610231" y="922704"/>
+            <a:ext cx="808235" cy="303481"/>
+          </a:xfrm>
+          <a:prstGeom prst="rect">
+            <a:avLst/>
+          </a:prstGeom>
+          <a:noFill/>
+        </p:spPr>
+        <p:txBody>
+          <a:bodyPr wrap="none" rtlCol="0">
+            <a:spAutoFit/>
+          </a:bodyPr>
+          <a:lstStyle/>
+          <a:p>
+            <a:r>
+              <a:rPr lang="en-US" sz="1372" b="1" i="1" dirty="0">
+                <a:solidFill>
+                  <a:srgbClr val="FF0000"/>
+                </a:solidFill>
+              </a:rPr>
+              <a:t>&lt;</a:t>
+            </a:r>
+            <a:r>
+              <a:rPr lang="en-US" sz="1372" b="1" i="1" dirty="0" err="1">
+                <a:solidFill>
+                  <a:srgbClr val="FF0000"/>
+                </a:solidFill>
+              </a:rPr>
+              <a:t>Signin</a:t>
+            </a:r>
+            <a:r>
+              <a:rPr lang="en-US" sz="1372" b="1" i="1" dirty="0">
+                <a:solidFill>
+                  <a:srgbClr val="FF0000"/>
+                </a:solidFill>
+              </a:rPr>
+              <a:t>&gt;</a:t>
+            </a:r>
+          </a:p>
+        </p:txBody>
+      </p:sp>
+      <p:sp>
+        <p:nvSpPr>
+          <p:cNvPr id="40" name="Rounded Rectangle 19">
             <a:extLst>
               <a:ext uri="{FF2B5EF4-FFF2-40B4-BE49-F238E27FC236}">
-                <a16:creationId xmlns:a16="http://schemas.microsoft.com/office/drawing/2014/main" id="{E2DC3A0E-0C6C-48A4-9272-B6DF93213E90}"/>
+                <a16:creationId xmlns:a16="http://schemas.microsoft.com/office/drawing/2014/main" id="{320B1BAD-52FD-4AD4-9133-A0E040DA0A47}"/>
               </a:ext>
             </a:extLst>
           </p:cNvPr>
@@ -5414,8 +5312,8 @@
         </p:nvSpPr>
         <p:spPr>
           <a:xfrm>
-            <a:off x="8135172" y="292113"/>
-            <a:ext cx="1650319" cy="1166483"/>
+            <a:off x="3496115" y="1618232"/>
+            <a:ext cx="938268" cy="668688"/>
           </a:xfrm>
           <a:prstGeom prst="roundRect">
             <a:avLst/>
@@ -5455,10 +5353,10 @@
       </p:sp>
       <p:sp>
         <p:nvSpPr>
-          <p:cNvPr id="29" name="TextBox 28">
+          <p:cNvPr id="41" name="TextBox 40">
             <a:extLst>
               <a:ext uri="{FF2B5EF4-FFF2-40B4-BE49-F238E27FC236}">
-                <a16:creationId xmlns:a16="http://schemas.microsoft.com/office/drawing/2014/main" id="{5AF9EC71-2FD4-4B45-812D-1A69991F44D9}"/>
+                <a16:creationId xmlns:a16="http://schemas.microsoft.com/office/drawing/2014/main" id="{907B84A3-E698-4DB7-B844-FB35C23350AC}"/>
               </a:ext>
             </a:extLst>
           </p:cNvPr>
@@ -5467,43 +5365,8 @@
         </p:nvSpPr>
         <p:spPr>
           <a:xfrm>
-            <a:off x="8625046" y="695021"/>
-            <a:ext cx="670568" cy="303481"/>
-          </a:xfrm>
-          <a:prstGeom prst="rect">
-            <a:avLst/>
-          </a:prstGeom>
-          <a:noFill/>
-        </p:spPr>
-        <p:txBody>
-          <a:bodyPr wrap="none" rtlCol="0">
-            <a:spAutoFit/>
-          </a:bodyPr>
-          <a:lstStyle/>
-          <a:p>
-            <a:r>
-              <a:rPr lang="en-US" sz="1372" dirty="0"/>
-              <a:t>users[]</a:t>
-            </a:r>
-          </a:p>
-        </p:txBody>
-      </p:sp>
-      <p:sp>
-        <p:nvSpPr>
-          <p:cNvPr id="30" name="TextBox 29">
-            <a:extLst>
-              <a:ext uri="{FF2B5EF4-FFF2-40B4-BE49-F238E27FC236}">
-                <a16:creationId xmlns:a16="http://schemas.microsoft.com/office/drawing/2014/main" id="{D4A3B7F0-2DF5-4BFE-AD02-1303A3AD67B7}"/>
-              </a:ext>
-            </a:extLst>
-          </p:cNvPr>
-          <p:cNvSpPr txBox="1"/>
-          <p:nvPr/>
-        </p:nvSpPr>
-        <p:spPr>
-          <a:xfrm>
-            <a:off x="8244173" y="372063"/>
-            <a:ext cx="1432315" cy="303481"/>
+            <a:off x="3610231" y="1731820"/>
+            <a:ext cx="857927" cy="303481"/>
           </a:xfrm>
           <a:prstGeom prst="rect">
             <a:avLst/>
@@ -5522,36 +5385,128 @@
                   <a:srgbClr val="FF0000"/>
                 </a:solidFill>
               </a:rPr>
-              <a:t>&lt;sign in/sign up&gt;</a:t>
-            </a:r>
-          </a:p>
-        </p:txBody>
-      </p:sp>
-      <p:cxnSp>
-        <p:nvCxnSpPr>
-          <p:cNvPr id="34" name="Straight Arrow Connector 33">
+              <a:t>&lt;Signup&gt;</a:t>
+            </a:r>
+          </a:p>
+        </p:txBody>
+      </p:sp>
+      <p:sp>
+        <p:nvSpPr>
+          <p:cNvPr id="46" name="TextBox 45">
             <a:extLst>
               <a:ext uri="{FF2B5EF4-FFF2-40B4-BE49-F238E27FC236}">
-                <a16:creationId xmlns:a16="http://schemas.microsoft.com/office/drawing/2014/main" id="{D550B14B-BD9F-4FEF-9467-94E67A5EC951}"/>
+                <a16:creationId xmlns:a16="http://schemas.microsoft.com/office/drawing/2014/main" id="{01AD307D-1853-471D-A6FE-EE027E548082}"/>
               </a:ext>
             </a:extLst>
           </p:cNvPr>
-          <p:cNvCxnSpPr>
-            <a:cxnSpLocks/>
-          </p:cNvCxnSpPr>
-          <p:nvPr/>
-        </p:nvCxnSpPr>
-        <p:spPr>
-          <a:xfrm flipH="1" flipV="1">
-            <a:off x="6459934" y="4897153"/>
-            <a:ext cx="1608908" cy="837015"/>
-          </a:xfrm>
-          <a:prstGeom prst="straightConnector1">
-            <a:avLst/>
-          </a:prstGeom>
-          <a:ln>
-            <a:tailEnd type="triangle"/>
-          </a:ln>
+          <p:cNvSpPr txBox="1"/>
+          <p:nvPr/>
+        </p:nvSpPr>
+        <p:spPr>
+          <a:xfrm>
+            <a:off x="5250894" y="991719"/>
+            <a:ext cx="627095" cy="303481"/>
+          </a:xfrm>
+          <a:prstGeom prst="rect">
+            <a:avLst/>
+          </a:prstGeom>
+          <a:noFill/>
+        </p:spPr>
+        <p:txBody>
+          <a:bodyPr wrap="none" rtlCol="0">
+            <a:spAutoFit/>
+          </a:bodyPr>
+          <a:lstStyle/>
+          <a:p>
+            <a:r>
+              <a:rPr lang="en-US" sz="1372" b="1" i="1" dirty="0">
+                <a:solidFill>
+                  <a:srgbClr val="FF0000"/>
+                </a:solidFill>
+              </a:rPr>
+              <a:t>&lt;slot&gt;</a:t>
+            </a:r>
+          </a:p>
+        </p:txBody>
+      </p:sp>
+      <p:sp>
+        <p:nvSpPr>
+          <p:cNvPr id="59" name="TextBox 58">
+            <a:extLst>
+              <a:ext uri="{FF2B5EF4-FFF2-40B4-BE49-F238E27FC236}">
+                <a16:creationId xmlns:a16="http://schemas.microsoft.com/office/drawing/2014/main" id="{2D5D87B0-EE16-4904-BD09-B6BE1990B36A}"/>
+              </a:ext>
+            </a:extLst>
+          </p:cNvPr>
+          <p:cNvSpPr txBox="1"/>
+          <p:nvPr/>
+        </p:nvSpPr>
+        <p:spPr>
+          <a:xfrm>
+            <a:off x="5940332" y="991718"/>
+            <a:ext cx="1036759" cy="303481"/>
+          </a:xfrm>
+          <a:prstGeom prst="rect">
+            <a:avLst/>
+          </a:prstGeom>
+          <a:noFill/>
+        </p:spPr>
+        <p:txBody>
+          <a:bodyPr wrap="none" rtlCol="0">
+            <a:spAutoFit/>
+          </a:bodyPr>
+          <a:lstStyle/>
+          <a:p>
+            <a:r>
+              <a:rPr lang="en-US" sz="1372" b="1" i="1" dirty="0">
+                <a:solidFill>
+                  <a:srgbClr val="FF0000"/>
+                </a:solidFill>
+              </a:rPr>
+              <a:t>&lt;</a:t>
+            </a:r>
+            <a:r>
+              <a:rPr lang="en-US" sz="1372" b="1" i="1" dirty="0" err="1">
+                <a:solidFill>
+                  <a:srgbClr val="FF0000"/>
+                </a:solidFill>
+              </a:rPr>
+              <a:t>base_btn</a:t>
+            </a:r>
+            <a:r>
+              <a:rPr lang="en-US" sz="1372" b="1" i="1" dirty="0">
+                <a:solidFill>
+                  <a:srgbClr val="FF0000"/>
+                </a:solidFill>
+              </a:rPr>
+              <a:t>&gt;</a:t>
+            </a:r>
+          </a:p>
+        </p:txBody>
+      </p:sp>
+      <p:sp>
+        <p:nvSpPr>
+          <p:cNvPr id="10" name="Right Brace 9">
+            <a:extLst>
+              <a:ext uri="{FF2B5EF4-FFF2-40B4-BE49-F238E27FC236}">
+                <a16:creationId xmlns:a16="http://schemas.microsoft.com/office/drawing/2014/main" id="{F5ACB810-E464-413E-A863-97FAC11B1A19}"/>
+              </a:ext>
+            </a:extLst>
+          </p:cNvPr>
+          <p:cNvSpPr/>
+          <p:nvPr/>
+        </p:nvSpPr>
+        <p:spPr>
+          <a:xfrm>
+            <a:off x="4635224" y="295836"/>
+            <a:ext cx="501553" cy="1739465"/>
+          </a:xfrm>
+          <a:prstGeom prst="rightBrace">
+            <a:avLst>
+              <a:gd name="adj1" fmla="val 37825"/>
+              <a:gd name="adj2" fmla="val 48454"/>
+            </a:avLst>
+          </a:prstGeom>
         </p:spPr>
         <p:style>
           <a:lnRef idx="1">
@@ -5567,206 +5522,21 @@
             <a:schemeClr val="tx1"/>
           </a:fontRef>
         </p:style>
-      </p:cxnSp>
-      <p:cxnSp>
-        <p:nvCxnSpPr>
-          <p:cNvPr id="36" name="Straight Arrow Connector 35">
+        <p:txBody>
+          <a:bodyPr rtlCol="0" anchor="ctr"/>
+          <a:lstStyle/>
+          <a:p>
+            <a:pPr algn="ctr"/>
+            <a:endParaRPr lang="en-US"/>
+          </a:p>
+        </p:txBody>
+      </p:sp>
+      <p:sp>
+        <p:nvSpPr>
+          <p:cNvPr id="60" name="Arrow: Right 59">
             <a:extLst>
               <a:ext uri="{FF2B5EF4-FFF2-40B4-BE49-F238E27FC236}">
-                <a16:creationId xmlns:a16="http://schemas.microsoft.com/office/drawing/2014/main" id="{67C25321-B8FD-416F-941A-C430E8CC21AD}"/>
-              </a:ext>
-            </a:extLst>
-          </p:cNvPr>
-          <p:cNvCxnSpPr>
-            <a:cxnSpLocks/>
-            <a:endCxn id="5" idx="2"/>
-          </p:cNvCxnSpPr>
-          <p:nvPr/>
-        </p:nvCxnSpPr>
-        <p:spPr>
-          <a:xfrm flipH="1" flipV="1">
-            <a:off x="2093812" y="1690287"/>
-            <a:ext cx="2833102" cy="2122514"/>
-          </a:xfrm>
-          <a:prstGeom prst="straightConnector1">
-            <a:avLst/>
-          </a:prstGeom>
-          <a:ln>
-            <a:tailEnd type="triangle"/>
-          </a:ln>
-        </p:spPr>
-        <p:style>
-          <a:lnRef idx="1">
-            <a:schemeClr val="accent1"/>
-          </a:lnRef>
-          <a:fillRef idx="0">
-            <a:schemeClr val="accent1"/>
-          </a:fillRef>
-          <a:effectRef idx="0">
-            <a:schemeClr val="accent1"/>
-          </a:effectRef>
-          <a:fontRef idx="minor">
-            <a:schemeClr val="tx1"/>
-          </a:fontRef>
-        </p:style>
-      </p:cxnSp>
-      <p:sp>
-        <p:nvSpPr>
-          <p:cNvPr id="43" name="TextBox 42">
-            <a:extLst>
-              <a:ext uri="{FF2B5EF4-FFF2-40B4-BE49-F238E27FC236}">
-                <a16:creationId xmlns:a16="http://schemas.microsoft.com/office/drawing/2014/main" id="{449AB93D-5B80-4DAF-A123-6C06E85D78C0}"/>
-              </a:ext>
-            </a:extLst>
-          </p:cNvPr>
-          <p:cNvSpPr txBox="1"/>
-          <p:nvPr/>
-        </p:nvSpPr>
-        <p:spPr>
-          <a:xfrm>
-            <a:off x="8299024" y="5680246"/>
-            <a:ext cx="1485984" cy="303481"/>
-          </a:xfrm>
-          <a:prstGeom prst="rect">
-            <a:avLst/>
-          </a:prstGeom>
-          <a:noFill/>
-        </p:spPr>
-        <p:txBody>
-          <a:bodyPr wrap="none" rtlCol="0">
-            <a:spAutoFit/>
-          </a:bodyPr>
-          <a:lstStyle/>
-          <a:p>
-            <a:r>
-              <a:rPr lang="en-US" sz="1372" b="1" i="1" dirty="0">
-                <a:solidFill>
-                  <a:srgbClr val="FF0000"/>
-                </a:solidFill>
-              </a:rPr>
-              <a:t>&lt;Category-event&gt;</a:t>
-            </a:r>
-          </a:p>
-        </p:txBody>
-      </p:sp>
-      <p:sp>
-        <p:nvSpPr>
-          <p:cNvPr id="44" name="TextBox 43">
-            <a:extLst>
-              <a:ext uri="{FF2B5EF4-FFF2-40B4-BE49-F238E27FC236}">
-                <a16:creationId xmlns:a16="http://schemas.microsoft.com/office/drawing/2014/main" id="{BEFB7E2D-91C1-4487-A57E-32A15CE835DA}"/>
-              </a:ext>
-            </a:extLst>
-          </p:cNvPr>
-          <p:cNvSpPr txBox="1"/>
-          <p:nvPr/>
-        </p:nvSpPr>
-        <p:spPr>
-          <a:xfrm>
-            <a:off x="8662842" y="5882089"/>
-            <a:ext cx="698268" cy="303481"/>
-          </a:xfrm>
-          <a:prstGeom prst="rect">
-            <a:avLst/>
-          </a:prstGeom>
-          <a:noFill/>
-        </p:spPr>
-        <p:txBody>
-          <a:bodyPr wrap="none" rtlCol="0">
-            <a:spAutoFit/>
-          </a:bodyPr>
-          <a:lstStyle/>
-          <a:p>
-            <a:r>
-              <a:rPr lang="en-US" sz="1372" dirty="0"/>
-              <a:t>event[]</a:t>
-            </a:r>
-          </a:p>
-        </p:txBody>
-      </p:sp>
-      <p:cxnSp>
-        <p:nvCxnSpPr>
-          <p:cNvPr id="45" name="Straight Arrow Connector 44">
-            <a:extLst>
-              <a:ext uri="{FF2B5EF4-FFF2-40B4-BE49-F238E27FC236}">
-                <a16:creationId xmlns:a16="http://schemas.microsoft.com/office/drawing/2014/main" id="{FFF4E7D7-E04A-4AD2-BD34-008BAB75B1EB}"/>
-              </a:ext>
-            </a:extLst>
-          </p:cNvPr>
-          <p:cNvCxnSpPr>
-            <a:cxnSpLocks/>
-            <a:stCxn id="8" idx="1"/>
-          </p:cNvCxnSpPr>
-          <p:nvPr/>
-        </p:nvCxnSpPr>
-        <p:spPr>
-          <a:xfrm flipH="1">
-            <a:off x="6555053" y="3983293"/>
-            <a:ext cx="1580120" cy="135893"/>
-          </a:xfrm>
-          <a:prstGeom prst="straightConnector1">
-            <a:avLst/>
-          </a:prstGeom>
-          <a:ln>
-            <a:tailEnd type="triangle"/>
-          </a:ln>
-        </p:spPr>
-        <p:style>
-          <a:lnRef idx="1">
-            <a:schemeClr val="accent1"/>
-          </a:lnRef>
-          <a:fillRef idx="0">
-            <a:schemeClr val="accent1"/>
-          </a:fillRef>
-          <a:effectRef idx="0">
-            <a:schemeClr val="accent1"/>
-          </a:effectRef>
-          <a:fontRef idx="minor">
-            <a:schemeClr val="tx1"/>
-          </a:fontRef>
-        </p:style>
-      </p:cxnSp>
-      <p:sp>
-        <p:nvSpPr>
-          <p:cNvPr id="47" name="TextBox 46">
-            <a:extLst>
-              <a:ext uri="{FF2B5EF4-FFF2-40B4-BE49-F238E27FC236}">
-                <a16:creationId xmlns:a16="http://schemas.microsoft.com/office/drawing/2014/main" id="{9FD8220A-62D5-4E83-97B6-A18797F1547A}"/>
-              </a:ext>
-            </a:extLst>
-          </p:cNvPr>
-          <p:cNvSpPr txBox="1"/>
-          <p:nvPr/>
-        </p:nvSpPr>
-        <p:spPr>
-          <a:xfrm>
-            <a:off x="1907379" y="850917"/>
-            <a:ext cx="698268" cy="303481"/>
-          </a:xfrm>
-          <a:prstGeom prst="rect">
-            <a:avLst/>
-          </a:prstGeom>
-          <a:noFill/>
-        </p:spPr>
-        <p:txBody>
-          <a:bodyPr wrap="none" rtlCol="0">
-            <a:spAutoFit/>
-          </a:bodyPr>
-          <a:lstStyle/>
-          <a:p>
-            <a:r>
-              <a:rPr lang="en-US" sz="1372" dirty="0"/>
-              <a:t>event[]</a:t>
-            </a:r>
-          </a:p>
-        </p:txBody>
-      </p:sp>
-      <p:sp>
-        <p:nvSpPr>
-          <p:cNvPr id="48" name="Rounded Rectangle 19">
-            <a:extLst>
-              <a:ext uri="{FF2B5EF4-FFF2-40B4-BE49-F238E27FC236}">
-                <a16:creationId xmlns:a16="http://schemas.microsoft.com/office/drawing/2014/main" id="{5CF67617-A289-4B21-89C3-E2A42CA478D0}"/>
+                <a16:creationId xmlns:a16="http://schemas.microsoft.com/office/drawing/2014/main" id="{9B556CDB-23A2-4E13-91EC-898336C385AB}"/>
               </a:ext>
             </a:extLst>
           </p:cNvPr>
@@ -5774,20 +5544,13 @@
           <p:nvPr/>
         </p:nvSpPr>
         <p:spPr>
-          <a:xfrm>
-            <a:off x="1281029" y="3073888"/>
-            <a:ext cx="1650319" cy="1166483"/>
-          </a:xfrm>
-          <a:prstGeom prst="roundRect">
-            <a:avLst/>
-          </a:prstGeom>
-          <a:noFill/>
-          <a:ln>
-            <a:solidFill>
-              <a:srgbClr val="FF0000"/>
-            </a:solidFill>
-            <a:prstDash val="lgDash"/>
-          </a:ln>
+          <a:xfrm rot="5400000">
+            <a:off x="627597" y="2029702"/>
+            <a:ext cx="1373326" cy="306015"/>
+          </a:xfrm>
+          <a:prstGeom prst="rightArrow">
+            <a:avLst/>
+          </a:prstGeom>
         </p:spPr>
         <p:style>
           <a:lnRef idx="2">
@@ -5810,16 +5573,16 @@
           <a:lstStyle/>
           <a:p>
             <a:pPr algn="ctr"/>
-            <a:endParaRPr lang="en-US" sz="1372"/>
-          </a:p>
-        </p:txBody>
-      </p:sp>
-      <p:sp>
-        <p:nvSpPr>
-          <p:cNvPr id="49" name="Rounded Rectangle 19">
+            <a:endParaRPr lang="en-US"/>
+          </a:p>
+        </p:txBody>
+      </p:sp>
+      <p:sp>
+        <p:nvSpPr>
+          <p:cNvPr id="61" name="Rounded Rectangle 19">
             <a:extLst>
               <a:ext uri="{FF2B5EF4-FFF2-40B4-BE49-F238E27FC236}">
-                <a16:creationId xmlns:a16="http://schemas.microsoft.com/office/drawing/2014/main" id="{C6B7C5F2-F491-42FE-8F78-2880D2CAF4B2}"/>
+                <a16:creationId xmlns:a16="http://schemas.microsoft.com/office/drawing/2014/main" id="{55CAF342-4D87-4F79-88F7-0F01E17688AE}"/>
               </a:ext>
             </a:extLst>
           </p:cNvPr>
@@ -5828,8 +5591,8 @@
         </p:nvSpPr>
         <p:spPr>
           <a:xfrm>
-            <a:off x="4591790" y="390070"/>
-            <a:ext cx="1650319" cy="1166483"/>
+            <a:off x="583891" y="3164798"/>
+            <a:ext cx="1351810" cy="806718"/>
           </a:xfrm>
           <a:prstGeom prst="roundRect">
             <a:avLst/>
@@ -5869,63 +5632,10 @@
       </p:sp>
       <p:sp>
         <p:nvSpPr>
-          <p:cNvPr id="50" name="Rounded Rectangle 19">
+          <p:cNvPr id="62" name="TextBox 61">
             <a:extLst>
               <a:ext uri="{FF2B5EF4-FFF2-40B4-BE49-F238E27FC236}">
-                <a16:creationId xmlns:a16="http://schemas.microsoft.com/office/drawing/2014/main" id="{4E224C4E-AC86-4698-95AF-580204C1F5FD}"/>
-              </a:ext>
-            </a:extLst>
-          </p:cNvPr>
-          <p:cNvSpPr/>
-          <p:nvPr/>
-        </p:nvSpPr>
-        <p:spPr>
-          <a:xfrm>
-            <a:off x="1431353" y="5579736"/>
-            <a:ext cx="1650319" cy="1166483"/>
-          </a:xfrm>
-          <a:prstGeom prst="roundRect">
-            <a:avLst/>
-          </a:prstGeom>
-          <a:noFill/>
-          <a:ln>
-            <a:solidFill>
-              <a:srgbClr val="FF0000"/>
-            </a:solidFill>
-            <a:prstDash val="lgDash"/>
-          </a:ln>
-        </p:spPr>
-        <p:style>
-          <a:lnRef idx="2">
-            <a:schemeClr val="accent1">
-              <a:shade val="50000"/>
-            </a:schemeClr>
-          </a:lnRef>
-          <a:fillRef idx="1">
-            <a:schemeClr val="accent1"/>
-          </a:fillRef>
-          <a:effectRef idx="0">
-            <a:schemeClr val="accent1"/>
-          </a:effectRef>
-          <a:fontRef idx="minor">
-            <a:schemeClr val="lt1"/>
-          </a:fontRef>
-        </p:style>
-        <p:txBody>
-          <a:bodyPr rtlCol="0" anchor="ctr"/>
-          <a:lstStyle/>
-          <a:p>
-            <a:pPr algn="ctr"/>
-            <a:endParaRPr lang="en-US" sz="1372"/>
-          </a:p>
-        </p:txBody>
-      </p:sp>
-      <p:sp>
-        <p:nvSpPr>
-          <p:cNvPr id="51" name="TextBox 50">
-            <a:extLst>
-              <a:ext uri="{FF2B5EF4-FFF2-40B4-BE49-F238E27FC236}">
-                <a16:creationId xmlns:a16="http://schemas.microsoft.com/office/drawing/2014/main" id="{A30A5703-AE9F-4FFE-902E-0AEA34B856BB}"/>
+                <a16:creationId xmlns:a16="http://schemas.microsoft.com/office/drawing/2014/main" id="{E65B3AC2-ADE4-4DAF-90CC-3815443E31CC}"/>
               </a:ext>
             </a:extLst>
           </p:cNvPr>
@@ -5934,8 +5644,8 @@
         </p:nvSpPr>
         <p:spPr>
           <a:xfrm>
-            <a:off x="1783397" y="3104271"/>
-            <a:ext cx="763351" cy="303481"/>
+            <a:off x="802779" y="3292433"/>
+            <a:ext cx="914033" cy="303481"/>
           </a:xfrm>
           <a:prstGeom prst="rect">
             <a:avLst/>
@@ -5954,321 +5664,11 @@
                   <a:srgbClr val="FF0000"/>
                 </a:solidFill>
               </a:rPr>
-              <a:t>&lt;Users&gt;</a:t>
-            </a:r>
-          </a:p>
-        </p:txBody>
-      </p:sp>
-      <p:sp>
-        <p:nvSpPr>
-          <p:cNvPr id="52" name="TextBox 51">
-            <a:extLst>
-              <a:ext uri="{FF2B5EF4-FFF2-40B4-BE49-F238E27FC236}">
-                <a16:creationId xmlns:a16="http://schemas.microsoft.com/office/drawing/2014/main" id="{C02F2270-D9A2-418C-A39F-D7370575088F}"/>
-              </a:ext>
-            </a:extLst>
-          </p:cNvPr>
-          <p:cNvSpPr txBox="1"/>
-          <p:nvPr/>
-        </p:nvSpPr>
-        <p:spPr>
-          <a:xfrm>
-            <a:off x="4922978" y="415031"/>
-            <a:ext cx="1053494" cy="303481"/>
-          </a:xfrm>
-          <a:prstGeom prst="rect">
-            <a:avLst/>
-          </a:prstGeom>
-          <a:noFill/>
-        </p:spPr>
-        <p:txBody>
-          <a:bodyPr wrap="none" rtlCol="0">
-            <a:spAutoFit/>
-          </a:bodyPr>
-          <a:lstStyle/>
-          <a:p>
-            <a:r>
-              <a:rPr lang="en-US" sz="1372" b="1" i="1" dirty="0">
-                <a:solidFill>
-                  <a:srgbClr val="FF0000"/>
-                </a:solidFill>
-              </a:rPr>
-              <a:t>&lt;Members&gt;</a:t>
-            </a:r>
-          </a:p>
-        </p:txBody>
-      </p:sp>
-      <p:sp>
-        <p:nvSpPr>
-          <p:cNvPr id="53" name="TextBox 52">
-            <a:extLst>
-              <a:ext uri="{FF2B5EF4-FFF2-40B4-BE49-F238E27FC236}">
-                <a16:creationId xmlns:a16="http://schemas.microsoft.com/office/drawing/2014/main" id="{DE4B26AC-1246-4302-8C27-359869308A75}"/>
-              </a:ext>
-            </a:extLst>
-          </p:cNvPr>
-          <p:cNvSpPr txBox="1"/>
-          <p:nvPr/>
-        </p:nvSpPr>
-        <p:spPr>
-          <a:xfrm>
-            <a:off x="1875021" y="5582427"/>
-            <a:ext cx="899605" cy="303481"/>
-          </a:xfrm>
-          <a:prstGeom prst="rect">
-            <a:avLst/>
-          </a:prstGeom>
-          <a:noFill/>
-        </p:spPr>
-        <p:txBody>
-          <a:bodyPr wrap="none" rtlCol="0">
-            <a:spAutoFit/>
-          </a:bodyPr>
-          <a:lstStyle/>
-          <a:p>
-            <a:r>
-              <a:rPr lang="en-US" sz="1372" b="1" i="1" dirty="0">
-                <a:solidFill>
-                  <a:srgbClr val="FF0000"/>
-                </a:solidFill>
-              </a:rPr>
-              <a:t>&lt;Actions&gt;</a:t>
-            </a:r>
-          </a:p>
-        </p:txBody>
-      </p:sp>
-      <p:sp>
-        <p:nvSpPr>
-          <p:cNvPr id="54" name="TextBox 53">
-            <a:extLst>
-              <a:ext uri="{FF2B5EF4-FFF2-40B4-BE49-F238E27FC236}">
-                <a16:creationId xmlns:a16="http://schemas.microsoft.com/office/drawing/2014/main" id="{81762D77-26DB-41B9-9DBF-240E2E667625}"/>
-              </a:ext>
-            </a:extLst>
-          </p:cNvPr>
-          <p:cNvSpPr txBox="1"/>
-          <p:nvPr/>
-        </p:nvSpPr>
-        <p:spPr>
-          <a:xfrm>
-            <a:off x="1920750" y="5882088"/>
-            <a:ext cx="698268" cy="303481"/>
-          </a:xfrm>
-          <a:prstGeom prst="rect">
-            <a:avLst/>
-          </a:prstGeom>
-          <a:noFill/>
-        </p:spPr>
-        <p:txBody>
-          <a:bodyPr wrap="none" rtlCol="0">
-            <a:spAutoFit/>
-          </a:bodyPr>
-          <a:lstStyle/>
-          <a:p>
-            <a:r>
-              <a:rPr lang="en-US" sz="1372" dirty="0"/>
-              <a:t>event[]</a:t>
-            </a:r>
-          </a:p>
-        </p:txBody>
-      </p:sp>
-      <p:sp>
-        <p:nvSpPr>
-          <p:cNvPr id="55" name="TextBox 54">
-            <a:extLst>
-              <a:ext uri="{FF2B5EF4-FFF2-40B4-BE49-F238E27FC236}">
-                <a16:creationId xmlns:a16="http://schemas.microsoft.com/office/drawing/2014/main" id="{CCAA0C64-4DD8-4B59-93CD-3776A57D6C2A}"/>
-              </a:ext>
-            </a:extLst>
-          </p:cNvPr>
-          <p:cNvSpPr txBox="1"/>
-          <p:nvPr/>
-        </p:nvSpPr>
-        <p:spPr>
-          <a:xfrm>
-            <a:off x="1802776" y="3291549"/>
-            <a:ext cx="698268" cy="303481"/>
-          </a:xfrm>
-          <a:prstGeom prst="rect">
-            <a:avLst/>
-          </a:prstGeom>
-          <a:noFill/>
-        </p:spPr>
-        <p:txBody>
-          <a:bodyPr wrap="none" rtlCol="0">
-            <a:spAutoFit/>
-          </a:bodyPr>
-          <a:lstStyle/>
-          <a:p>
-            <a:r>
-              <a:rPr lang="en-US" sz="1372" dirty="0"/>
-              <a:t>event[]</a:t>
-            </a:r>
-          </a:p>
-        </p:txBody>
-      </p:sp>
-      <p:sp>
-        <p:nvSpPr>
-          <p:cNvPr id="56" name="TextBox 55">
-            <a:extLst>
-              <a:ext uri="{FF2B5EF4-FFF2-40B4-BE49-F238E27FC236}">
-                <a16:creationId xmlns:a16="http://schemas.microsoft.com/office/drawing/2014/main" id="{9A0EE01C-D993-48E1-A1D1-07D4007175DA}"/>
-              </a:ext>
-            </a:extLst>
-          </p:cNvPr>
-          <p:cNvSpPr txBox="1"/>
-          <p:nvPr/>
-        </p:nvSpPr>
-        <p:spPr>
-          <a:xfrm>
-            <a:off x="5090138" y="743120"/>
-            <a:ext cx="698268" cy="303481"/>
-          </a:xfrm>
-          <a:prstGeom prst="rect">
-            <a:avLst/>
-          </a:prstGeom>
-          <a:noFill/>
-        </p:spPr>
-        <p:txBody>
-          <a:bodyPr wrap="none" rtlCol="0">
-            <a:spAutoFit/>
-          </a:bodyPr>
-          <a:lstStyle/>
-          <a:p>
-            <a:r>
-              <a:rPr lang="en-US" sz="1372" dirty="0"/>
-              <a:t>event[]</a:t>
-            </a:r>
-          </a:p>
-        </p:txBody>
-      </p:sp>
-      <p:cxnSp>
-        <p:nvCxnSpPr>
-          <p:cNvPr id="57" name="Straight Arrow Connector 56">
-            <a:extLst>
-              <a:ext uri="{FF2B5EF4-FFF2-40B4-BE49-F238E27FC236}">
-                <a16:creationId xmlns:a16="http://schemas.microsoft.com/office/drawing/2014/main" id="{0D9BFEF0-AFDB-4846-9D1B-B9B36DA2540C}"/>
-              </a:ext>
-            </a:extLst>
-          </p:cNvPr>
-          <p:cNvCxnSpPr>
-            <a:cxnSpLocks/>
-            <a:stCxn id="50" idx="3"/>
-          </p:cNvCxnSpPr>
-          <p:nvPr/>
-        </p:nvCxnSpPr>
-        <p:spPr>
-          <a:xfrm flipV="1">
-            <a:off x="3081672" y="4897154"/>
-            <a:ext cx="1841306" cy="1265824"/>
-          </a:xfrm>
-          <a:prstGeom prst="straightConnector1">
-            <a:avLst/>
-          </a:prstGeom>
-          <a:ln>
-            <a:tailEnd type="triangle"/>
-          </a:ln>
-        </p:spPr>
-        <p:style>
-          <a:lnRef idx="1">
-            <a:schemeClr val="accent1"/>
-          </a:lnRef>
-          <a:fillRef idx="0">
-            <a:schemeClr val="accent1"/>
-          </a:fillRef>
-          <a:effectRef idx="0">
-            <a:schemeClr val="accent1"/>
-          </a:effectRef>
-          <a:fontRef idx="minor">
-            <a:schemeClr val="tx1"/>
-          </a:fontRef>
-        </p:style>
-      </p:cxnSp>
-      <p:cxnSp>
-        <p:nvCxnSpPr>
-          <p:cNvPr id="58" name="Straight Arrow Connector 57">
-            <a:extLst>
-              <a:ext uri="{FF2B5EF4-FFF2-40B4-BE49-F238E27FC236}">
-                <a16:creationId xmlns:a16="http://schemas.microsoft.com/office/drawing/2014/main" id="{3F22593D-50DF-42B8-A315-19C932F28B34}"/>
-              </a:ext>
-            </a:extLst>
-          </p:cNvPr>
-          <p:cNvCxnSpPr>
-            <a:cxnSpLocks/>
-            <a:stCxn id="48" idx="3"/>
-            <a:endCxn id="12" idx="1"/>
-          </p:cNvCxnSpPr>
-          <p:nvPr/>
-        </p:nvCxnSpPr>
-        <p:spPr>
-          <a:xfrm>
-            <a:off x="2931348" y="3657130"/>
-            <a:ext cx="1958239" cy="711262"/>
-          </a:xfrm>
-          <a:prstGeom prst="straightConnector1">
-            <a:avLst/>
-          </a:prstGeom>
-          <a:ln>
-            <a:tailEnd type="triangle"/>
-          </a:ln>
-        </p:spPr>
-        <p:style>
-          <a:lnRef idx="1">
-            <a:schemeClr val="accent1"/>
-          </a:lnRef>
-          <a:fillRef idx="0">
-            <a:schemeClr val="accent1"/>
-          </a:fillRef>
-          <a:effectRef idx="0">
-            <a:schemeClr val="accent1"/>
-          </a:effectRef>
-          <a:fontRef idx="minor">
-            <a:schemeClr val="tx1"/>
-          </a:fontRef>
-        </p:style>
-      </p:cxnSp>
-      <p:cxnSp>
-        <p:nvCxnSpPr>
-          <p:cNvPr id="66" name="Straight Arrow Connector 65">
-            <a:extLst>
-              <a:ext uri="{FF2B5EF4-FFF2-40B4-BE49-F238E27FC236}">
-                <a16:creationId xmlns:a16="http://schemas.microsoft.com/office/drawing/2014/main" id="{D80697C9-03B3-4B0A-8FA6-67B1AECC7530}"/>
-              </a:ext>
-            </a:extLst>
-          </p:cNvPr>
-          <p:cNvCxnSpPr>
-            <a:cxnSpLocks/>
-            <a:endCxn id="12" idx="0"/>
-          </p:cNvCxnSpPr>
-          <p:nvPr/>
-        </p:nvCxnSpPr>
-        <p:spPr>
-          <a:xfrm>
-            <a:off x="5304819" y="1556553"/>
-            <a:ext cx="409928" cy="2228597"/>
-          </a:xfrm>
-          <a:prstGeom prst="straightConnector1">
-            <a:avLst/>
-          </a:prstGeom>
-          <a:ln>
-            <a:tailEnd type="triangle"/>
-          </a:ln>
-        </p:spPr>
-        <p:style>
-          <a:lnRef idx="1">
-            <a:schemeClr val="accent1"/>
-          </a:lnRef>
-          <a:fillRef idx="0">
-            <a:schemeClr val="accent1"/>
-          </a:fillRef>
-          <a:effectRef idx="0">
-            <a:schemeClr val="accent1"/>
-          </a:effectRef>
-          <a:fontRef idx="minor">
-            <a:schemeClr val="tx1"/>
-          </a:fontRef>
-        </p:style>
-      </p:cxnSp>
+              <a:t>&lt;Sidebar&gt;</a:t>
+            </a:r>
+          </a:p>
+        </p:txBody>
+      </p:sp>
     </p:spTree>
     <p:extLst>
       <p:ext uri="{BB962C8B-B14F-4D97-AF65-F5344CB8AC3E}">

</xml_diff>